<commit_message>
Workflow changed to:  1. Create `ScenarioConfiguration`  2. Create `Scenario`  3. Run `Scenario`
- New class `Scenario`
- New function `createScenarios()` that creates `Scenario` objects from `ScenarioConfiguration`
- `runScenarios()` requires `Scenario` objects
- `setTestParameters` has been removed from `ScenarioConfiguration`. All additional parameters must be supplied by `customParams` argument to `createScenarios()`
- `simulationRunOptions` is not a part of `ScenarioConfiguration` but an argument of `runScenarios()`
- Custom functions to simulations are not supported any more, as direct access to the `Simulation` object is possible through `Scenario` objects

- Function `initializeScenario()` removed.
- Function `setApplications()` is deprecated.
</commit_message>
<xml_diff>
--- a/Workflow_scheme.pptx
+++ b/Workflow_scheme.pptx
@@ -3359,7 +3359,7 @@
         </a:p>
       </dgm:t>
     </dgm:pt>
-    <dgm:pt modelId="{904A5E4D-E340-444D-A17E-D26A08D4D0CA}">
+    <dgm:pt modelId="{91FC2AB7-B1E8-4D87-AF6A-71E755A3CAA2}">
       <dgm:prSet phldrT="[Text]" custT="1"/>
       <dgm:spPr/>
       <dgm:t>
@@ -3372,11 +3372,43 @@
           </a:r>
           <a:r>
             <a:rPr lang="de-DE" sz="1600" dirty="0" err="1"/>
-            <a:t>defined</a:t>
+            <a:t>passed</a:t>
           </a:r>
           <a:r>
             <a:rPr lang="de-DE" sz="1600" dirty="0"/>
-            <a:t> in </a:t>
+            <a:t> </a:t>
+          </a:r>
+          <a:r>
+            <a:rPr lang="de-DE" sz="1600" dirty="0" err="1"/>
+            <a:t>to</a:t>
+          </a:r>
+          <a:r>
+            <a:rPr lang="de-DE" sz="1600" dirty="0"/>
+            <a:t> „</a:t>
+          </a:r>
+          <a:r>
+            <a:rPr lang="de-DE" sz="1600" dirty="0" err="1"/>
+            <a:t>runScenarios</a:t>
+          </a:r>
+          <a:r>
+            <a:rPr lang="de-DE" sz="1600" dirty="0"/>
+            <a:t>()“ </a:t>
+          </a:r>
+          <a:r>
+            <a:rPr lang="de-DE" sz="1600" dirty="0" err="1"/>
+            <a:t>function</a:t>
+          </a:r>
+          <a:r>
+            <a:rPr lang="de-DE" sz="1600" dirty="0"/>
+            <a:t> </a:t>
+          </a:r>
+          <a:r>
+            <a:rPr lang="de-DE" sz="1600" dirty="0" err="1"/>
+            <a:t>with</a:t>
+          </a:r>
+          <a:r>
+            <a:rPr lang="de-DE" sz="1600" dirty="0"/>
+            <a:t> </a:t>
           </a:r>
           <a:r>
             <a:rPr lang="de-DE" sz="1600" dirty="0" err="1"/>
@@ -3384,28 +3416,25 @@
           </a:r>
           <a:r>
             <a:rPr lang="de-DE" sz="1600" dirty="0"/>
-            <a:t> „Code/</a:t>
+            <a:t> „</a:t>
           </a:r>
           <a:r>
             <a:rPr lang="de-DE" sz="1600" dirty="0" err="1"/>
-            <a:t>InputCode</a:t>
+            <a:t>customParams</a:t>
           </a:r>
           <a:r>
             <a:rPr lang="de-DE" sz="1600" dirty="0"/>
-            <a:t>/</a:t>
+            <a:t>“ </a:t>
           </a:r>
           <a:r>
             <a:rPr lang="de-DE" sz="1600" dirty="0" err="1"/>
-            <a:t>TestParameters.R</a:t>
-          </a:r>
-          <a:r>
-            <a:rPr lang="de-DE" sz="1600" dirty="0"/>
-            <a:t>“</a:t>
-          </a:r>
+            <a:t>argument</a:t>
+          </a:r>
+          <a:endParaRPr lang="de-DE" sz="1600" dirty="0"/>
         </a:p>
       </dgm:t>
     </dgm:pt>
-    <dgm:pt modelId="{8E3136ED-0CB7-4600-BF24-1FD1CD7E43EA}" type="parTrans" cxnId="{C6B3718C-B4DA-4F52-8997-16313F1728AA}">
+    <dgm:pt modelId="{D6B86AE7-3792-458A-98FF-74E6B591785F}" type="parTrans" cxnId="{D66BDF65-AD23-4328-B996-97D85E65D8D4}">
       <dgm:prSet/>
       <dgm:spPr/>
       <dgm:t>
@@ -3416,93 +3445,7 @@
         </a:p>
       </dgm:t>
     </dgm:pt>
-    <dgm:pt modelId="{84DFCA05-8CD1-4341-901B-BC2EC2304DDB}" type="sibTrans" cxnId="{C6B3718C-B4DA-4F52-8997-16313F1728AA}">
-      <dgm:prSet custT="1"/>
-      <dgm:spPr/>
-      <dgm:t>
-        <a:bodyPr/>
-        <a:lstStyle/>
-        <a:p>
-          <a:endParaRPr lang="en-US" sz="2400"/>
-        </a:p>
-      </dgm:t>
-    </dgm:pt>
-    <dgm:pt modelId="{91FC2AB7-B1E8-4D87-AF6A-71E755A3CAA2}">
-      <dgm:prSet phldrT="[Text]" custT="1"/>
-      <dgm:spPr/>
-      <dgm:t>
-        <a:bodyPr/>
-        <a:lstStyle/>
-        <a:p>
-          <a:r>
-            <a:rPr lang="de-DE" sz="1600" dirty="0"/>
-            <a:t>Parameters </a:t>
-          </a:r>
-          <a:r>
-            <a:rPr lang="de-DE" sz="1600" dirty="0" err="1"/>
-            <a:t>passed</a:t>
-          </a:r>
-          <a:r>
-            <a:rPr lang="de-DE" sz="1600" dirty="0"/>
-            <a:t> </a:t>
-          </a:r>
-          <a:r>
-            <a:rPr lang="de-DE" sz="1600" dirty="0" err="1"/>
-            <a:t>to</a:t>
-          </a:r>
-          <a:r>
-            <a:rPr lang="de-DE" sz="1600" dirty="0"/>
-            <a:t> „</a:t>
-          </a:r>
-          <a:r>
-            <a:rPr lang="de-DE" sz="1600" dirty="0" err="1"/>
-            <a:t>runScenarios</a:t>
-          </a:r>
-          <a:r>
-            <a:rPr lang="de-DE" sz="1600" dirty="0"/>
-            <a:t>()“ </a:t>
-          </a:r>
-          <a:r>
-            <a:rPr lang="de-DE" sz="1600" dirty="0" err="1"/>
-            <a:t>function</a:t>
-          </a:r>
-          <a:r>
-            <a:rPr lang="de-DE" sz="1600" dirty="0"/>
-            <a:t> </a:t>
-          </a:r>
-          <a:r>
-            <a:rPr lang="de-DE" sz="1600" dirty="0" err="1"/>
-            <a:t>with</a:t>
-          </a:r>
-          <a:r>
-            <a:rPr lang="de-DE" sz="1600" dirty="0"/>
-            <a:t> </a:t>
-          </a:r>
-          <a:r>
-            <a:rPr lang="de-DE" sz="1600" dirty="0" err="1"/>
-            <a:t>the</a:t>
-          </a:r>
-          <a:r>
-            <a:rPr lang="de-DE" sz="1600" dirty="0"/>
-            <a:t> „</a:t>
-          </a:r>
-          <a:r>
-            <a:rPr lang="de-DE" sz="1600" dirty="0" err="1"/>
-            <a:t>customParams</a:t>
-          </a:r>
-          <a:r>
-            <a:rPr lang="de-DE" sz="1600" dirty="0"/>
-            <a:t>“ </a:t>
-          </a:r>
-          <a:r>
-            <a:rPr lang="de-DE" sz="1600" dirty="0" err="1"/>
-            <a:t>argument</a:t>
-          </a:r>
-          <a:endParaRPr lang="de-DE" sz="1600" dirty="0"/>
-        </a:p>
-      </dgm:t>
-    </dgm:pt>
-    <dgm:pt modelId="{D6B86AE7-3792-458A-98FF-74E6B591785F}" type="parTrans" cxnId="{D66BDF65-AD23-4328-B996-97D85E65D8D4}">
+    <dgm:pt modelId="{69FE11D4-A6F2-44FB-9706-14C29F2E3AC8}" type="sibTrans" cxnId="{D66BDF65-AD23-4328-B996-97D85E65D8D4}">
       <dgm:prSet/>
       <dgm:spPr/>
       <dgm:t>
@@ -3513,7 +3456,50 @@
         </a:p>
       </dgm:t>
     </dgm:pt>
-    <dgm:pt modelId="{69FE11D4-A6F2-44FB-9706-14C29F2E3AC8}" type="sibTrans" cxnId="{D66BDF65-AD23-4328-B996-97D85E65D8D4}">
+    <dgm:pt modelId="{904D13CF-20B5-45F7-B411-C4B04322AD45}">
+      <dgm:prSet phldrT="[Text]"/>
+      <dgm:spPr/>
+      <dgm:t>
+        <a:bodyPr/>
+        <a:lstStyle/>
+        <a:p>
+          <a:r>
+            <a:rPr lang="de-DE" sz="1400" dirty="0"/>
+            <a:t>Parameters </a:t>
+          </a:r>
+          <a:r>
+            <a:rPr lang="de-DE" sz="1400" dirty="0" err="1"/>
+            <a:t>defined</a:t>
+          </a:r>
+          <a:r>
+            <a:rPr lang="de-DE" sz="1400" dirty="0"/>
+            <a:t> in </a:t>
+          </a:r>
+          <a:r>
+            <a:rPr lang="de-DE" sz="1400" dirty="0" err="1"/>
+            <a:t>the</a:t>
+          </a:r>
+          <a:r>
+            <a:rPr lang="de-DE" sz="1400" dirty="0"/>
+            <a:t> </a:t>
+          </a:r>
+          <a:r>
+            <a:rPr lang="de-DE" sz="1400" dirty="0" err="1"/>
+            <a:t>Application</a:t>
+          </a:r>
+          <a:r>
+            <a:rPr lang="de-DE" sz="1400" dirty="0"/>
+            <a:t> </a:t>
+          </a:r>
+          <a:r>
+            <a:rPr lang="de-DE" sz="1400" dirty="0" err="1"/>
+            <a:t>protocol</a:t>
+          </a:r>
+          <a:endParaRPr lang="de-DE" sz="1400" dirty="0"/>
+        </a:p>
+      </dgm:t>
+    </dgm:pt>
+    <dgm:pt modelId="{99E8C748-AFDC-4A43-B7B7-8C9ABB77872B}" type="parTrans" cxnId="{6ED578E0-0714-4963-AC6F-BA4BCDA4DEDD}">
       <dgm:prSet/>
       <dgm:spPr/>
       <dgm:t>
@@ -3524,50 +3510,7 @@
         </a:p>
       </dgm:t>
     </dgm:pt>
-    <dgm:pt modelId="{904D13CF-20B5-45F7-B411-C4B04322AD45}">
-      <dgm:prSet phldrT="[Text]"/>
-      <dgm:spPr/>
-      <dgm:t>
-        <a:bodyPr/>
-        <a:lstStyle/>
-        <a:p>
-          <a:r>
-            <a:rPr lang="de-DE" sz="1400" dirty="0"/>
-            <a:t>Parameters </a:t>
-          </a:r>
-          <a:r>
-            <a:rPr lang="de-DE" sz="1400" dirty="0" err="1"/>
-            <a:t>defined</a:t>
-          </a:r>
-          <a:r>
-            <a:rPr lang="de-DE" sz="1400" dirty="0"/>
-            <a:t> in </a:t>
-          </a:r>
-          <a:r>
-            <a:rPr lang="de-DE" sz="1400" dirty="0" err="1"/>
-            <a:t>the</a:t>
-          </a:r>
-          <a:r>
-            <a:rPr lang="de-DE" sz="1400" dirty="0"/>
-            <a:t> </a:t>
-          </a:r>
-          <a:r>
-            <a:rPr lang="de-DE" sz="1400" dirty="0" err="1"/>
-            <a:t>Application</a:t>
-          </a:r>
-          <a:r>
-            <a:rPr lang="de-DE" sz="1400" dirty="0"/>
-            <a:t> </a:t>
-          </a:r>
-          <a:r>
-            <a:rPr lang="de-DE" sz="1400" dirty="0" err="1"/>
-            <a:t>protocol</a:t>
-          </a:r>
-          <a:endParaRPr lang="de-DE" sz="1400" dirty="0"/>
-        </a:p>
-      </dgm:t>
-    </dgm:pt>
-    <dgm:pt modelId="{99E8C748-AFDC-4A43-B7B7-8C9ABB77872B}" type="parTrans" cxnId="{6ED578E0-0714-4963-AC6F-BA4BCDA4DEDD}">
+    <dgm:pt modelId="{E8F05EC8-AF1F-4FDC-91AE-4FAE4C0B9391}" type="sibTrans" cxnId="{6ED578E0-0714-4963-AC6F-BA4BCDA4DEDD}">
       <dgm:prSet/>
       <dgm:spPr/>
       <dgm:t>
@@ -3578,17 +3521,6 @@
         </a:p>
       </dgm:t>
     </dgm:pt>
-    <dgm:pt modelId="{E8F05EC8-AF1F-4FDC-91AE-4FAE4C0B9391}" type="sibTrans" cxnId="{6ED578E0-0714-4963-AC6F-BA4BCDA4DEDD}">
-      <dgm:prSet/>
-      <dgm:spPr/>
-      <dgm:t>
-        <a:bodyPr/>
-        <a:lstStyle/>
-        <a:p>
-          <a:endParaRPr lang="en-US"/>
-        </a:p>
-      </dgm:t>
-    </dgm:pt>
     <dgm:pt modelId="{0F8C4796-60B9-44F0-95F7-C8F53E0D6F5B}" type="pres">
       <dgm:prSet presAssocID="{4C6B6F34-EBF2-438E-B3B7-957DBAF6DA06}" presName="linearFlow" presStyleCnt="0">
         <dgm:presLayoutVars>
@@ -3598,7 +3530,7 @@
       <dgm:spPr/>
     </dgm:pt>
     <dgm:pt modelId="{32F3F580-B4AE-4A75-B4D5-199177EDC857}" type="pres">
-      <dgm:prSet presAssocID="{6E63DDAB-E0C7-493D-AA1D-876DA0421EBF}" presName="node" presStyleLbl="node1" presStyleIdx="0" presStyleCnt="6">
+      <dgm:prSet presAssocID="{6E63DDAB-E0C7-493D-AA1D-876DA0421EBF}" presName="node" presStyleLbl="node1" presStyleIdx="0" presStyleCnt="5">
         <dgm:presLayoutVars>
           <dgm:bulletEnabled val="1"/>
         </dgm:presLayoutVars>
@@ -3606,15 +3538,15 @@
       <dgm:spPr/>
     </dgm:pt>
     <dgm:pt modelId="{DE734AF0-F15D-43AA-9AA5-E7449D3D3242}" type="pres">
-      <dgm:prSet presAssocID="{0C0BF99E-58D0-4FAA-A800-B1F81FBC0008}" presName="sibTrans" presStyleLbl="sibTrans2D1" presStyleIdx="0" presStyleCnt="5"/>
+      <dgm:prSet presAssocID="{0C0BF99E-58D0-4FAA-A800-B1F81FBC0008}" presName="sibTrans" presStyleLbl="sibTrans2D1" presStyleIdx="0" presStyleCnt="4"/>
       <dgm:spPr/>
     </dgm:pt>
     <dgm:pt modelId="{5E1CEAA5-0423-4DCA-8EB1-AEC797E763EE}" type="pres">
-      <dgm:prSet presAssocID="{0C0BF99E-58D0-4FAA-A800-B1F81FBC0008}" presName="connectorText" presStyleLbl="sibTrans2D1" presStyleIdx="0" presStyleCnt="5"/>
+      <dgm:prSet presAssocID="{0C0BF99E-58D0-4FAA-A800-B1F81FBC0008}" presName="connectorText" presStyleLbl="sibTrans2D1" presStyleIdx="0" presStyleCnt="4"/>
       <dgm:spPr/>
     </dgm:pt>
     <dgm:pt modelId="{8DB52F31-1B42-4B55-A5C5-93099FA660CA}" type="pres">
-      <dgm:prSet presAssocID="{D9A164A5-C4EE-4E2C-BCB9-FC9B1367C8C9}" presName="node" presStyleLbl="node1" presStyleIdx="1" presStyleCnt="6">
+      <dgm:prSet presAssocID="{D9A164A5-C4EE-4E2C-BCB9-FC9B1367C8C9}" presName="node" presStyleLbl="node1" presStyleIdx="1" presStyleCnt="5">
         <dgm:presLayoutVars>
           <dgm:bulletEnabled val="1"/>
         </dgm:presLayoutVars>
@@ -3622,15 +3554,15 @@
       <dgm:spPr/>
     </dgm:pt>
     <dgm:pt modelId="{D4AF0274-1388-4F6B-8D53-52A6FED89246}" type="pres">
-      <dgm:prSet presAssocID="{3A3A765D-45CB-4909-B3B4-7B9C8089DBBE}" presName="sibTrans" presStyleLbl="sibTrans2D1" presStyleIdx="1" presStyleCnt="5"/>
+      <dgm:prSet presAssocID="{3A3A765D-45CB-4909-B3B4-7B9C8089DBBE}" presName="sibTrans" presStyleLbl="sibTrans2D1" presStyleIdx="1" presStyleCnt="4"/>
       <dgm:spPr/>
     </dgm:pt>
     <dgm:pt modelId="{FA84D1E7-8CF9-4F3E-B109-DBB564D82884}" type="pres">
-      <dgm:prSet presAssocID="{3A3A765D-45CB-4909-B3B4-7B9C8089DBBE}" presName="connectorText" presStyleLbl="sibTrans2D1" presStyleIdx="1" presStyleCnt="5"/>
+      <dgm:prSet presAssocID="{3A3A765D-45CB-4909-B3B4-7B9C8089DBBE}" presName="connectorText" presStyleLbl="sibTrans2D1" presStyleIdx="1" presStyleCnt="4"/>
       <dgm:spPr/>
     </dgm:pt>
     <dgm:pt modelId="{393E3C96-C34C-451A-92F8-886DD2CD2B93}" type="pres">
-      <dgm:prSet presAssocID="{0EA7596A-34F1-4CE4-AD46-2937F6D05F61}" presName="node" presStyleLbl="node1" presStyleIdx="2" presStyleCnt="6">
+      <dgm:prSet presAssocID="{0EA7596A-34F1-4CE4-AD46-2937F6D05F61}" presName="node" presStyleLbl="node1" presStyleIdx="2" presStyleCnt="5">
         <dgm:presLayoutVars>
           <dgm:bulletEnabled val="1"/>
         </dgm:presLayoutVars>
@@ -3638,75 +3570,55 @@
       <dgm:spPr/>
     </dgm:pt>
     <dgm:pt modelId="{018C7C0E-1BF5-4952-ACA5-977E53384722}" type="pres">
-      <dgm:prSet presAssocID="{E3006435-1BF9-4FD6-9C31-7ED4490DE600}" presName="sibTrans" presStyleLbl="sibTrans2D1" presStyleIdx="2" presStyleCnt="5"/>
+      <dgm:prSet presAssocID="{E3006435-1BF9-4FD6-9C31-7ED4490DE600}" presName="sibTrans" presStyleLbl="sibTrans2D1" presStyleIdx="2" presStyleCnt="4"/>
       <dgm:spPr/>
     </dgm:pt>
     <dgm:pt modelId="{9A6F0891-C47C-4E2B-BFC4-7050A71F9598}" type="pres">
-      <dgm:prSet presAssocID="{E3006435-1BF9-4FD6-9C31-7ED4490DE600}" presName="connectorText" presStyleLbl="sibTrans2D1" presStyleIdx="2" presStyleCnt="5"/>
-      <dgm:spPr/>
-    </dgm:pt>
-    <dgm:pt modelId="{3C8485D3-5E38-4106-AB35-87DD069A821F}" type="pres">
-      <dgm:prSet presAssocID="{904A5E4D-E340-444D-A17E-D26A08D4D0CA}" presName="node" presStyleLbl="node1" presStyleIdx="3" presStyleCnt="6">
+      <dgm:prSet presAssocID="{E3006435-1BF9-4FD6-9C31-7ED4490DE600}" presName="connectorText" presStyleLbl="sibTrans2D1" presStyleIdx="2" presStyleCnt="4"/>
+      <dgm:spPr/>
+    </dgm:pt>
+    <dgm:pt modelId="{164DDEB3-DF6D-4D8A-AB77-57CE925C2E9F}" type="pres">
+      <dgm:prSet presAssocID="{91FC2AB7-B1E8-4D87-AF6A-71E755A3CAA2}" presName="node" presStyleLbl="node1" presStyleIdx="3" presStyleCnt="5">
         <dgm:presLayoutVars>
           <dgm:bulletEnabled val="1"/>
         </dgm:presLayoutVars>
       </dgm:prSet>
       <dgm:spPr/>
     </dgm:pt>
-    <dgm:pt modelId="{648E255A-B01E-4EFD-BD53-6C00B2E025D5}" type="pres">
-      <dgm:prSet presAssocID="{84DFCA05-8CD1-4341-901B-BC2EC2304DDB}" presName="sibTrans" presStyleLbl="sibTrans2D1" presStyleIdx="3" presStyleCnt="5"/>
-      <dgm:spPr/>
-    </dgm:pt>
-    <dgm:pt modelId="{A925C887-9070-437F-84BF-13625E2D8C00}" type="pres">
-      <dgm:prSet presAssocID="{84DFCA05-8CD1-4341-901B-BC2EC2304DDB}" presName="connectorText" presStyleLbl="sibTrans2D1" presStyleIdx="3" presStyleCnt="5"/>
-      <dgm:spPr/>
-    </dgm:pt>
-    <dgm:pt modelId="{164DDEB3-DF6D-4D8A-AB77-57CE925C2E9F}" type="pres">
-      <dgm:prSet presAssocID="{91FC2AB7-B1E8-4D87-AF6A-71E755A3CAA2}" presName="node" presStyleLbl="node1" presStyleIdx="4" presStyleCnt="6">
+    <dgm:pt modelId="{9BA57664-CD12-4F05-BF31-8399FF3938EE}" type="pres">
+      <dgm:prSet presAssocID="{69FE11D4-A6F2-44FB-9706-14C29F2E3AC8}" presName="sibTrans" presStyleLbl="sibTrans2D1" presStyleIdx="3" presStyleCnt="4"/>
+      <dgm:spPr/>
+    </dgm:pt>
+    <dgm:pt modelId="{C5DEC020-9475-4AE8-B5C4-B31F7E4BC4BF}" type="pres">
+      <dgm:prSet presAssocID="{69FE11D4-A6F2-44FB-9706-14C29F2E3AC8}" presName="connectorText" presStyleLbl="sibTrans2D1" presStyleIdx="3" presStyleCnt="4"/>
+      <dgm:spPr/>
+    </dgm:pt>
+    <dgm:pt modelId="{6F905638-7C0C-4414-A139-2B2E5BFB3BD8}" type="pres">
+      <dgm:prSet presAssocID="{904D13CF-20B5-45F7-B411-C4B04322AD45}" presName="node" presStyleLbl="node1" presStyleIdx="4" presStyleCnt="5">
         <dgm:presLayoutVars>
           <dgm:bulletEnabled val="1"/>
         </dgm:presLayoutVars>
       </dgm:prSet>
       <dgm:spPr/>
     </dgm:pt>
-    <dgm:pt modelId="{9BA57664-CD12-4F05-BF31-8399FF3938EE}" type="pres">
-      <dgm:prSet presAssocID="{69FE11D4-A6F2-44FB-9706-14C29F2E3AC8}" presName="sibTrans" presStyleLbl="sibTrans2D1" presStyleIdx="4" presStyleCnt="5"/>
-      <dgm:spPr/>
-    </dgm:pt>
-    <dgm:pt modelId="{C5DEC020-9475-4AE8-B5C4-B31F7E4BC4BF}" type="pres">
-      <dgm:prSet presAssocID="{69FE11D4-A6F2-44FB-9706-14C29F2E3AC8}" presName="connectorText" presStyleLbl="sibTrans2D1" presStyleIdx="4" presStyleCnt="5"/>
-      <dgm:spPr/>
-    </dgm:pt>
-    <dgm:pt modelId="{6F905638-7C0C-4414-A139-2B2E5BFB3BD8}" type="pres">
-      <dgm:prSet presAssocID="{904D13CF-20B5-45F7-B411-C4B04322AD45}" presName="node" presStyleLbl="node1" presStyleIdx="5" presStyleCnt="6">
-        <dgm:presLayoutVars>
-          <dgm:bulletEnabled val="1"/>
-        </dgm:presLayoutVars>
-      </dgm:prSet>
-      <dgm:spPr/>
-    </dgm:pt>
   </dgm:ptLst>
   <dgm:cxnLst>
     <dgm:cxn modelId="{F97F7400-5F3F-4511-99AF-C09BD42FD039}" type="presOf" srcId="{E3006435-1BF9-4FD6-9C31-7ED4490DE600}" destId="{9A6F0891-C47C-4E2B-BFC4-7050A71F9598}" srcOrd="1" destOrd="0" presId="urn:microsoft.com/office/officeart/2005/8/layout/process2"/>
     <dgm:cxn modelId="{DD444703-08F9-4BBF-AC2A-0976E6EAA556}" srcId="{4C6B6F34-EBF2-438E-B3B7-957DBAF6DA06}" destId="{0EA7596A-34F1-4CE4-AD46-2937F6D05F61}" srcOrd="2" destOrd="0" parTransId="{F43BB90B-B156-42E6-9B7C-9F90F9B30A68}" sibTransId="{E3006435-1BF9-4FD6-9C31-7ED4490DE600}"/>
-    <dgm:cxn modelId="{0A9ED107-5EF4-4BED-ACB6-02FA1F2A5727}" type="presOf" srcId="{84DFCA05-8CD1-4341-901B-BC2EC2304DDB}" destId="{A925C887-9070-437F-84BF-13625E2D8C00}" srcOrd="1" destOrd="0" presId="urn:microsoft.com/office/officeart/2005/8/layout/process2"/>
     <dgm:cxn modelId="{085A1E0C-FAE9-4517-BEB5-3719AAFE0535}" type="presOf" srcId="{3A3A765D-45CB-4909-B3B4-7B9C8089DBBE}" destId="{D4AF0274-1388-4F6B-8D53-52A6FED89246}" srcOrd="0" destOrd="0" presId="urn:microsoft.com/office/officeart/2005/8/layout/process2"/>
     <dgm:cxn modelId="{58FFE822-79DD-45BE-A39D-0AEC2D33D243}" type="presOf" srcId="{D9A164A5-C4EE-4E2C-BCB9-FC9B1367C8C9}" destId="{8DB52F31-1B42-4B55-A5C5-93099FA660CA}" srcOrd="0" destOrd="0" presId="urn:microsoft.com/office/officeart/2005/8/layout/process2"/>
     <dgm:cxn modelId="{3B417F30-F813-4EA9-B108-43EF204F7770}" type="presOf" srcId="{0C0BF99E-58D0-4FAA-A800-B1F81FBC0008}" destId="{DE734AF0-F15D-43AA-9AA5-E7449D3D3242}" srcOrd="0" destOrd="0" presId="urn:microsoft.com/office/officeart/2005/8/layout/process2"/>
     <dgm:cxn modelId="{F0B6D332-99FB-4164-A8B7-AB0DED1125E0}" srcId="{4C6B6F34-EBF2-438E-B3B7-957DBAF6DA06}" destId="{6E63DDAB-E0C7-493D-AA1D-876DA0421EBF}" srcOrd="0" destOrd="0" parTransId="{0F29EA39-47A9-456B-B289-6276254019D4}" sibTransId="{0C0BF99E-58D0-4FAA-A800-B1F81FBC0008}"/>
     <dgm:cxn modelId="{7DF06565-05CB-4B0F-BBA8-F00B84787873}" type="presOf" srcId="{91FC2AB7-B1E8-4D87-AF6A-71E755A3CAA2}" destId="{164DDEB3-DF6D-4D8A-AB77-57CE925C2E9F}" srcOrd="0" destOrd="0" presId="urn:microsoft.com/office/officeart/2005/8/layout/process2"/>
-    <dgm:cxn modelId="{D66BDF65-AD23-4328-B996-97D85E65D8D4}" srcId="{4C6B6F34-EBF2-438E-B3B7-957DBAF6DA06}" destId="{91FC2AB7-B1E8-4D87-AF6A-71E755A3CAA2}" srcOrd="4" destOrd="0" parTransId="{D6B86AE7-3792-458A-98FF-74E6B591785F}" sibTransId="{69FE11D4-A6F2-44FB-9706-14C29F2E3AC8}"/>
+    <dgm:cxn modelId="{D66BDF65-AD23-4328-B996-97D85E65D8D4}" srcId="{4C6B6F34-EBF2-438E-B3B7-957DBAF6DA06}" destId="{91FC2AB7-B1E8-4D87-AF6A-71E755A3CAA2}" srcOrd="3" destOrd="0" parTransId="{D6B86AE7-3792-458A-98FF-74E6B591785F}" sibTransId="{69FE11D4-A6F2-44FB-9706-14C29F2E3AC8}"/>
     <dgm:cxn modelId="{041BE877-F74B-4506-8223-BAA0514CDF4F}" type="presOf" srcId="{4C6B6F34-EBF2-438E-B3B7-957DBAF6DA06}" destId="{0F8C4796-60B9-44F0-95F7-C8F53E0D6F5B}" srcOrd="0" destOrd="0" presId="urn:microsoft.com/office/officeart/2005/8/layout/process2"/>
     <dgm:cxn modelId="{9505A47A-7635-4F9C-ACDD-8AAC4600A121}" type="presOf" srcId="{69FE11D4-A6F2-44FB-9706-14C29F2E3AC8}" destId="{C5DEC020-9475-4AE8-B5C4-B31F7E4BC4BF}" srcOrd="1" destOrd="0" presId="urn:microsoft.com/office/officeart/2005/8/layout/process2"/>
     <dgm:cxn modelId="{13FCCE7E-9669-4D5E-95D5-2B01BD92A353}" type="presOf" srcId="{0C0BF99E-58D0-4FAA-A800-B1F81FBC0008}" destId="{5E1CEAA5-0423-4DCA-8EB1-AEC797E763EE}" srcOrd="1" destOrd="0" presId="urn:microsoft.com/office/officeart/2005/8/layout/process2"/>
-    <dgm:cxn modelId="{C6B3718C-B4DA-4F52-8997-16313F1728AA}" srcId="{4C6B6F34-EBF2-438E-B3B7-957DBAF6DA06}" destId="{904A5E4D-E340-444D-A17E-D26A08D4D0CA}" srcOrd="3" destOrd="0" parTransId="{8E3136ED-0CB7-4600-BF24-1FD1CD7E43EA}" sibTransId="{84DFCA05-8CD1-4341-901B-BC2EC2304DDB}"/>
     <dgm:cxn modelId="{727F38CF-C7C3-47A9-8F05-5B2A08850324}" type="presOf" srcId="{E3006435-1BF9-4FD6-9C31-7ED4490DE600}" destId="{018C7C0E-1BF5-4952-ACA5-977E53384722}" srcOrd="0" destOrd="0" presId="urn:microsoft.com/office/officeart/2005/8/layout/process2"/>
     <dgm:cxn modelId="{9DDAD1D2-B693-448D-AA4B-57AF44DAAFE5}" type="presOf" srcId="{3A3A765D-45CB-4909-B3B4-7B9C8089DBBE}" destId="{FA84D1E7-8CF9-4F3E-B109-DBB564D82884}" srcOrd="1" destOrd="0" presId="urn:microsoft.com/office/officeart/2005/8/layout/process2"/>
-    <dgm:cxn modelId="{9705BAD3-7F2D-4241-92F2-BB840FE574C1}" type="presOf" srcId="{84DFCA05-8CD1-4341-901B-BC2EC2304DDB}" destId="{648E255A-B01E-4EFD-BD53-6C00B2E025D5}" srcOrd="0" destOrd="0" presId="urn:microsoft.com/office/officeart/2005/8/layout/process2"/>
     <dgm:cxn modelId="{0642FAD5-29D0-4E72-AB17-3364D2E947FE}" type="presOf" srcId="{904D13CF-20B5-45F7-B411-C4B04322AD45}" destId="{6F905638-7C0C-4414-A139-2B2E5BFB3BD8}" srcOrd="0" destOrd="0" presId="urn:microsoft.com/office/officeart/2005/8/layout/process2"/>
-    <dgm:cxn modelId="{6ED578E0-0714-4963-AC6F-BA4BCDA4DEDD}" srcId="{4C6B6F34-EBF2-438E-B3B7-957DBAF6DA06}" destId="{904D13CF-20B5-45F7-B411-C4B04322AD45}" srcOrd="5" destOrd="0" parTransId="{99E8C748-AFDC-4A43-B7B7-8C9ABB77872B}" sibTransId="{E8F05EC8-AF1F-4FDC-91AE-4FAE4C0B9391}"/>
+    <dgm:cxn modelId="{6ED578E0-0714-4963-AC6F-BA4BCDA4DEDD}" srcId="{4C6B6F34-EBF2-438E-B3B7-957DBAF6DA06}" destId="{904D13CF-20B5-45F7-B411-C4B04322AD45}" srcOrd="4" destOrd="0" parTransId="{99E8C748-AFDC-4A43-B7B7-8C9ABB77872B}" sibTransId="{E8F05EC8-AF1F-4FDC-91AE-4FAE4C0B9391}"/>
     <dgm:cxn modelId="{84DA56E3-F24E-4F53-AD97-DB23D066A087}" type="presOf" srcId="{0EA7596A-34F1-4CE4-AD46-2937F6D05F61}" destId="{393E3C96-C34C-451A-92F8-886DD2CD2B93}" srcOrd="0" destOrd="0" presId="urn:microsoft.com/office/officeart/2005/8/layout/process2"/>
-    <dgm:cxn modelId="{6F71FCEA-ED53-4B1E-8280-7E0FE3A0F484}" type="presOf" srcId="{904A5E4D-E340-444D-A17E-D26A08D4D0CA}" destId="{3C8485D3-5E38-4106-AB35-87DD069A821F}" srcOrd="0" destOrd="0" presId="urn:microsoft.com/office/officeart/2005/8/layout/process2"/>
     <dgm:cxn modelId="{5D3071EB-87D3-4049-85C8-C8C2CA8C9DA1}" type="presOf" srcId="{69FE11D4-A6F2-44FB-9706-14C29F2E3AC8}" destId="{9BA57664-CD12-4F05-BF31-8399FF3938EE}" srcOrd="0" destOrd="0" presId="urn:microsoft.com/office/officeart/2005/8/layout/process2"/>
     <dgm:cxn modelId="{923B37EE-D128-4A8A-84A7-FA079699B387}" type="presOf" srcId="{6E63DDAB-E0C7-493D-AA1D-876DA0421EBF}" destId="{32F3F580-B4AE-4A75-B4D5-199177EDC857}" srcOrd="0" destOrd="0" presId="urn:microsoft.com/office/officeart/2005/8/layout/process2"/>
     <dgm:cxn modelId="{256209F6-6CBC-4B7E-B7FD-2B6C071D798B}" srcId="{4C6B6F34-EBF2-438E-B3B7-957DBAF6DA06}" destId="{D9A164A5-C4EE-4E2C-BCB9-FC9B1367C8C9}" srcOrd="1" destOrd="0" parTransId="{4AA0B12F-FC0A-441A-8E6D-B24937D51028}" sibTransId="{3A3A765D-45CB-4909-B3B4-7B9C8089DBBE}"/>
@@ -3719,13 +3631,10 @@
     <dgm:cxn modelId="{9DD2B436-5F21-4E06-AEA8-F4763CC1FC3A}" type="presParOf" srcId="{0F8C4796-60B9-44F0-95F7-C8F53E0D6F5B}" destId="{393E3C96-C34C-451A-92F8-886DD2CD2B93}" srcOrd="4" destOrd="0" presId="urn:microsoft.com/office/officeart/2005/8/layout/process2"/>
     <dgm:cxn modelId="{079CEB64-8379-4B4B-8CD1-1E1313245DFE}" type="presParOf" srcId="{0F8C4796-60B9-44F0-95F7-C8F53E0D6F5B}" destId="{018C7C0E-1BF5-4952-ACA5-977E53384722}" srcOrd="5" destOrd="0" presId="urn:microsoft.com/office/officeart/2005/8/layout/process2"/>
     <dgm:cxn modelId="{E2AEF74D-31B1-451D-9D8E-B03F88929D0F}" type="presParOf" srcId="{018C7C0E-1BF5-4952-ACA5-977E53384722}" destId="{9A6F0891-C47C-4E2B-BFC4-7050A71F9598}" srcOrd="0" destOrd="0" presId="urn:microsoft.com/office/officeart/2005/8/layout/process2"/>
-    <dgm:cxn modelId="{E8E62AF2-B90F-4439-9F99-35E8E7A7FA62}" type="presParOf" srcId="{0F8C4796-60B9-44F0-95F7-C8F53E0D6F5B}" destId="{3C8485D3-5E38-4106-AB35-87DD069A821F}" srcOrd="6" destOrd="0" presId="urn:microsoft.com/office/officeart/2005/8/layout/process2"/>
-    <dgm:cxn modelId="{380BEE7A-542D-4DEC-B690-87F89392795E}" type="presParOf" srcId="{0F8C4796-60B9-44F0-95F7-C8F53E0D6F5B}" destId="{648E255A-B01E-4EFD-BD53-6C00B2E025D5}" srcOrd="7" destOrd="0" presId="urn:microsoft.com/office/officeart/2005/8/layout/process2"/>
-    <dgm:cxn modelId="{D97A3EBF-4CCC-4EB1-8FE0-DC70956F2619}" type="presParOf" srcId="{648E255A-B01E-4EFD-BD53-6C00B2E025D5}" destId="{A925C887-9070-437F-84BF-13625E2D8C00}" srcOrd="0" destOrd="0" presId="urn:microsoft.com/office/officeart/2005/8/layout/process2"/>
-    <dgm:cxn modelId="{35376DAD-FC46-484D-94CE-3EC64D85CACF}" type="presParOf" srcId="{0F8C4796-60B9-44F0-95F7-C8F53E0D6F5B}" destId="{164DDEB3-DF6D-4D8A-AB77-57CE925C2E9F}" srcOrd="8" destOrd="0" presId="urn:microsoft.com/office/officeart/2005/8/layout/process2"/>
-    <dgm:cxn modelId="{B8FDD49C-5E2A-4F63-BD96-A33F796A894A}" type="presParOf" srcId="{0F8C4796-60B9-44F0-95F7-C8F53E0D6F5B}" destId="{9BA57664-CD12-4F05-BF31-8399FF3938EE}" srcOrd="9" destOrd="0" presId="urn:microsoft.com/office/officeart/2005/8/layout/process2"/>
+    <dgm:cxn modelId="{35376DAD-FC46-484D-94CE-3EC64D85CACF}" type="presParOf" srcId="{0F8C4796-60B9-44F0-95F7-C8F53E0D6F5B}" destId="{164DDEB3-DF6D-4D8A-AB77-57CE925C2E9F}" srcOrd="6" destOrd="0" presId="urn:microsoft.com/office/officeart/2005/8/layout/process2"/>
+    <dgm:cxn modelId="{B8FDD49C-5E2A-4F63-BD96-A33F796A894A}" type="presParOf" srcId="{0F8C4796-60B9-44F0-95F7-C8F53E0D6F5B}" destId="{9BA57664-CD12-4F05-BF31-8399FF3938EE}" srcOrd="7" destOrd="0" presId="urn:microsoft.com/office/officeart/2005/8/layout/process2"/>
     <dgm:cxn modelId="{FEA80009-8437-40D8-A756-FAEC93C34A2D}" type="presParOf" srcId="{9BA57664-CD12-4F05-BF31-8399FF3938EE}" destId="{C5DEC020-9475-4AE8-B5C4-B31F7E4BC4BF}" srcOrd="0" destOrd="0" presId="urn:microsoft.com/office/officeart/2005/8/layout/process2"/>
-    <dgm:cxn modelId="{2135BFA1-8F37-4129-84FB-B2C5E959083D}" type="presParOf" srcId="{0F8C4796-60B9-44F0-95F7-C8F53E0D6F5B}" destId="{6F905638-7C0C-4414-A139-2B2E5BFB3BD8}" srcOrd="10" destOrd="0" presId="urn:microsoft.com/office/officeart/2005/8/layout/process2"/>
+    <dgm:cxn modelId="{2135BFA1-8F37-4129-84FB-B2C5E959083D}" type="presParOf" srcId="{0F8C4796-60B9-44F0-95F7-C8F53E0D6F5B}" destId="{6F905638-7C0C-4414-A139-2B2E5BFB3BD8}" srcOrd="8" destOrd="0" presId="urn:microsoft.com/office/officeart/2005/8/layout/process2"/>
   </dgm:cxnLst>
   <dgm:bg/>
   <dgm:whole/>
@@ -5624,8 +5533,8 @@
       </dsp:nvSpPr>
       <dsp:spPr>
         <a:xfrm>
-          <a:off x="2565565" y="5643"/>
-          <a:ext cx="2996869" cy="749217"/>
+          <a:off x="2586222" y="778"/>
+          <a:ext cx="2955555" cy="911153"/>
         </a:xfrm>
         <a:prstGeom prst="roundRect">
           <a:avLst>
@@ -5702,8 +5611,8 @@
         </a:p>
       </dsp:txBody>
       <dsp:txXfrm>
-        <a:off x="2587509" y="27587"/>
-        <a:ext cx="2952981" cy="705329"/>
+        <a:off x="2612909" y="27465"/>
+        <a:ext cx="2902181" cy="857779"/>
       </dsp:txXfrm>
     </dsp:sp>
     <dsp:sp modelId="{DE734AF0-F15D-43AA-9AA5-E7449D3D3242}">
@@ -5713,8 +5622,8 @@
       </dsp:nvSpPr>
       <dsp:spPr>
         <a:xfrm rot="5400000">
-          <a:off x="3923521" y="773591"/>
-          <a:ext cx="280956" cy="337147"/>
+          <a:off x="3893158" y="934711"/>
+          <a:ext cx="341682" cy="410019"/>
         </a:xfrm>
         <a:prstGeom prst="rightArrow">
           <a:avLst>
@@ -5772,8 +5681,8 @@
         </a:p>
       </dsp:txBody>
       <dsp:txXfrm rot="-5400000">
-        <a:off x="3962855" y="801687"/>
-        <a:ext cx="202289" cy="196669"/>
+        <a:off x="3940994" y="968880"/>
+        <a:ext cx="246011" cy="239177"/>
       </dsp:txXfrm>
     </dsp:sp>
     <dsp:sp modelId="{8DB52F31-1B42-4B55-A5C5-93099FA660CA}">
@@ -5783,8 +5692,8 @@
       </dsp:nvSpPr>
       <dsp:spPr>
         <a:xfrm>
-          <a:off x="2565565" y="1129469"/>
-          <a:ext cx="2996869" cy="749217"/>
+          <a:off x="2586222" y="1367509"/>
+          <a:ext cx="2955555" cy="911153"/>
         </a:xfrm>
         <a:prstGeom prst="roundRect">
           <a:avLst>
@@ -5913,8 +5822,8 @@
         </a:p>
       </dsp:txBody>
       <dsp:txXfrm>
-        <a:off x="2587509" y="1151413"/>
-        <a:ext cx="2952981" cy="705329"/>
+        <a:off x="2612909" y="1394196"/>
+        <a:ext cx="2902181" cy="857779"/>
       </dsp:txXfrm>
     </dsp:sp>
     <dsp:sp modelId="{D4AF0274-1388-4F6B-8D53-52A6FED89246}">
@@ -5924,8 +5833,8 @@
       </dsp:nvSpPr>
       <dsp:spPr>
         <a:xfrm rot="5400000">
-          <a:off x="3923521" y="1897417"/>
-          <a:ext cx="280956" cy="337147"/>
+          <a:off x="3893158" y="2301442"/>
+          <a:ext cx="341682" cy="410019"/>
         </a:xfrm>
         <a:prstGeom prst="rightArrow">
           <a:avLst>
@@ -5983,8 +5892,8 @@
         </a:p>
       </dsp:txBody>
       <dsp:txXfrm rot="-5400000">
-        <a:off x="3962855" y="1925513"/>
-        <a:ext cx="202289" cy="196669"/>
+        <a:off x="3940994" y="2335611"/>
+        <a:ext cx="246011" cy="239177"/>
       </dsp:txXfrm>
     </dsp:sp>
     <dsp:sp modelId="{393E3C96-C34C-451A-92F8-886DD2CD2B93}">
@@ -5994,8 +5903,8 @@
       </dsp:nvSpPr>
       <dsp:spPr>
         <a:xfrm>
-          <a:off x="2565565" y="2253295"/>
-          <a:ext cx="2996869" cy="749217"/>
+          <a:off x="2586222" y="2734240"/>
+          <a:ext cx="2955555" cy="911153"/>
         </a:xfrm>
         <a:prstGeom prst="roundRect">
           <a:avLst>
@@ -6087,8 +5996,8 @@
         </a:p>
       </dsp:txBody>
       <dsp:txXfrm>
-        <a:off x="2587509" y="2275239"/>
-        <a:ext cx="2952981" cy="705329"/>
+        <a:off x="2612909" y="2760927"/>
+        <a:ext cx="2902181" cy="857779"/>
       </dsp:txXfrm>
     </dsp:sp>
     <dsp:sp modelId="{018C7C0E-1BF5-4952-ACA5-977E53384722}">
@@ -6098,8 +6007,8 @@
       </dsp:nvSpPr>
       <dsp:spPr>
         <a:xfrm rot="5400000">
-          <a:off x="3923521" y="3021243"/>
-          <a:ext cx="280956" cy="337147"/>
+          <a:off x="3893158" y="3668172"/>
+          <a:ext cx="341682" cy="410019"/>
         </a:xfrm>
         <a:prstGeom prst="rightArrow">
           <a:avLst>
@@ -6157,19 +6066,19 @@
         </a:p>
       </dsp:txBody>
       <dsp:txXfrm rot="-5400000">
-        <a:off x="3962855" y="3049339"/>
-        <a:ext cx="202289" cy="196669"/>
+        <a:off x="3940994" y="3702341"/>
+        <a:ext cx="246011" cy="239177"/>
       </dsp:txXfrm>
     </dsp:sp>
-    <dsp:sp modelId="{3C8485D3-5E38-4106-AB35-87DD069A821F}">
+    <dsp:sp modelId="{164DDEB3-DF6D-4D8A-AB77-57CE925C2E9F}">
       <dsp:nvSpPr>
         <dsp:cNvPr id="0" name=""/>
         <dsp:cNvSpPr/>
       </dsp:nvSpPr>
       <dsp:spPr>
         <a:xfrm>
-          <a:off x="2565565" y="3377121"/>
-          <a:ext cx="2996869" cy="749217"/>
+          <a:off x="2586222" y="4100970"/>
+          <a:ext cx="2955555" cy="911153"/>
         </a:xfrm>
         <a:prstGeom prst="roundRect">
           <a:avLst>
@@ -6236,11 +6145,43 @@
           </a:r>
           <a:r>
             <a:rPr lang="de-DE" sz="1600" kern="1200" dirty="0" err="1"/>
-            <a:t>defined</a:t>
+            <a:t>passed</a:t>
           </a:r>
           <a:r>
             <a:rPr lang="de-DE" sz="1600" kern="1200" dirty="0"/>
-            <a:t> in </a:t>
+            <a:t> </a:t>
+          </a:r>
+          <a:r>
+            <a:rPr lang="de-DE" sz="1600" kern="1200" dirty="0" err="1"/>
+            <a:t>to</a:t>
+          </a:r>
+          <a:r>
+            <a:rPr lang="de-DE" sz="1600" kern="1200" dirty="0"/>
+            <a:t> „</a:t>
+          </a:r>
+          <a:r>
+            <a:rPr lang="de-DE" sz="1600" kern="1200" dirty="0" err="1"/>
+            <a:t>runScenarios</a:t>
+          </a:r>
+          <a:r>
+            <a:rPr lang="de-DE" sz="1600" kern="1200" dirty="0"/>
+            <a:t>()“ </a:t>
+          </a:r>
+          <a:r>
+            <a:rPr lang="de-DE" sz="1600" kern="1200" dirty="0" err="1"/>
+            <a:t>function</a:t>
+          </a:r>
+          <a:r>
+            <a:rPr lang="de-DE" sz="1600" kern="1200" dirty="0"/>
+            <a:t> </a:t>
+          </a:r>
+          <a:r>
+            <a:rPr lang="de-DE" sz="1600" kern="1200" dirty="0" err="1"/>
+            <a:t>with</a:t>
+          </a:r>
+          <a:r>
+            <a:rPr lang="de-DE" sz="1600" kern="1200" dirty="0"/>
+            <a:t> </a:t>
           </a:r>
           <a:r>
             <a:rPr lang="de-DE" sz="1600" kern="1200" dirty="0" err="1"/>
@@ -6248,40 +6189,37 @@
           </a:r>
           <a:r>
             <a:rPr lang="de-DE" sz="1600" kern="1200" dirty="0"/>
-            <a:t> „Code/</a:t>
+            <a:t> „</a:t>
           </a:r>
           <a:r>
             <a:rPr lang="de-DE" sz="1600" kern="1200" dirty="0" err="1"/>
-            <a:t>InputCode</a:t>
+            <a:t>customParams</a:t>
           </a:r>
           <a:r>
             <a:rPr lang="de-DE" sz="1600" kern="1200" dirty="0"/>
-            <a:t>/</a:t>
+            <a:t>“ </a:t>
           </a:r>
           <a:r>
             <a:rPr lang="de-DE" sz="1600" kern="1200" dirty="0" err="1"/>
-            <a:t>TestParameters.R</a:t>
-          </a:r>
-          <a:r>
-            <a:rPr lang="de-DE" sz="1600" kern="1200" dirty="0"/>
-            <a:t>“</a:t>
-          </a:r>
+            <a:t>argument</a:t>
+          </a:r>
+          <a:endParaRPr lang="de-DE" sz="1600" kern="1200" dirty="0"/>
         </a:p>
       </dsp:txBody>
       <dsp:txXfrm>
-        <a:off x="2587509" y="3399065"/>
-        <a:ext cx="2952981" cy="705329"/>
+        <a:off x="2612909" y="4127657"/>
+        <a:ext cx="2902181" cy="857779"/>
       </dsp:txXfrm>
     </dsp:sp>
-    <dsp:sp modelId="{648E255A-B01E-4EFD-BD53-6C00B2E025D5}">
+    <dsp:sp modelId="{9BA57664-CD12-4F05-BF31-8399FF3938EE}">
       <dsp:nvSpPr>
         <dsp:cNvPr id="0" name=""/>
         <dsp:cNvSpPr/>
       </dsp:nvSpPr>
       <dsp:spPr>
         <a:xfrm rot="5400000">
-          <a:off x="3923521" y="4145069"/>
-          <a:ext cx="280956" cy="337147"/>
+          <a:off x="3893158" y="5034903"/>
+          <a:ext cx="341682" cy="410019"/>
         </a:xfrm>
         <a:prstGeom prst="rightArrow">
           <a:avLst>
@@ -6323,7 +6261,7 @@
         </a:bodyPr>
         <a:lstStyle/>
         <a:p>
-          <a:pPr marL="0" lvl="0" indent="0" algn="ctr" defTabSz="1066800">
+          <a:pPr marL="0" lvl="0" indent="0" algn="ctr" defTabSz="755650">
             <a:lnSpc>
               <a:spcPct val="90000"/>
             </a:lnSpc>
@@ -6335,23 +6273,23 @@
             </a:spcAft>
             <a:buNone/>
           </a:pPr>
-          <a:endParaRPr lang="en-US" sz="2400" kern="1200"/>
+          <a:endParaRPr lang="en-US" sz="1700" kern="1200"/>
         </a:p>
       </dsp:txBody>
       <dsp:txXfrm rot="-5400000">
-        <a:off x="3962855" y="4173165"/>
-        <a:ext cx="202289" cy="196669"/>
+        <a:off x="3940994" y="5069072"/>
+        <a:ext cx="246011" cy="239177"/>
       </dsp:txXfrm>
     </dsp:sp>
-    <dsp:sp modelId="{164DDEB3-DF6D-4D8A-AB77-57CE925C2E9F}">
+    <dsp:sp modelId="{6F905638-7C0C-4414-A139-2B2E5BFB3BD8}">
       <dsp:nvSpPr>
         <dsp:cNvPr id="0" name=""/>
         <dsp:cNvSpPr/>
       </dsp:nvSpPr>
       <dsp:spPr>
         <a:xfrm>
-          <a:off x="2565565" y="4500947"/>
-          <a:ext cx="2996869" cy="749217"/>
+          <a:off x="2586222" y="5467701"/>
+          <a:ext cx="2955555" cy="911153"/>
         </a:xfrm>
         <a:prstGeom prst="roundRect">
           <a:avLst>
@@ -6395,12 +6333,12 @@
         </a:fontRef>
       </dsp:style>
       <dsp:txBody>
-        <a:bodyPr spcFirstLastPara="0" vert="horz" wrap="square" lIns="60960" tIns="60960" rIns="60960" bIns="60960" numCol="1" spcCol="1270" anchor="ctr" anchorCtr="0">
+        <a:bodyPr spcFirstLastPara="0" vert="horz" wrap="square" lIns="80010" tIns="80010" rIns="80010" bIns="80010" numCol="1" spcCol="1270" anchor="ctr" anchorCtr="0">
           <a:noAutofit/>
         </a:bodyPr>
         <a:lstStyle/>
         <a:p>
-          <a:pPr marL="0" lvl="0" indent="0" algn="ctr" defTabSz="711200">
+          <a:pPr marL="0" lvl="0" indent="0" algn="ctr" defTabSz="933450">
             <a:lnSpc>
               <a:spcPct val="90000"/>
             </a:lnSpc>
@@ -6413,254 +6351,43 @@
             <a:buNone/>
           </a:pPr>
           <a:r>
-            <a:rPr lang="de-DE" sz="1600" kern="1200" dirty="0"/>
+            <a:rPr lang="de-DE" sz="2100" kern="1200" dirty="0"/>
             <a:t>Parameters </a:t>
           </a:r>
           <a:r>
-            <a:rPr lang="de-DE" sz="1600" kern="1200" dirty="0" err="1"/>
-            <a:t>passed</a:t>
-          </a:r>
-          <a:r>
-            <a:rPr lang="de-DE" sz="1600" kern="1200" dirty="0"/>
+            <a:rPr lang="de-DE" sz="2100" kern="1200" dirty="0" err="1"/>
+            <a:t>defined</a:t>
+          </a:r>
+          <a:r>
+            <a:rPr lang="de-DE" sz="2100" kern="1200" dirty="0"/>
+            <a:t> in </a:t>
+          </a:r>
+          <a:r>
+            <a:rPr lang="de-DE" sz="2100" kern="1200" dirty="0" err="1"/>
+            <a:t>the</a:t>
+          </a:r>
+          <a:r>
+            <a:rPr lang="de-DE" sz="2100" kern="1200" dirty="0"/>
             <a:t> </a:t>
           </a:r>
           <a:r>
-            <a:rPr lang="de-DE" sz="1600" kern="1200" dirty="0" err="1"/>
-            <a:t>to</a:t>
-          </a:r>
-          <a:r>
-            <a:rPr lang="de-DE" sz="1600" kern="1200" dirty="0"/>
-            <a:t> „</a:t>
-          </a:r>
-          <a:r>
-            <a:rPr lang="de-DE" sz="1600" kern="1200" dirty="0" err="1"/>
-            <a:t>runScenarios</a:t>
-          </a:r>
-          <a:r>
-            <a:rPr lang="de-DE" sz="1600" kern="1200" dirty="0"/>
-            <a:t>()“ </a:t>
-          </a:r>
-          <a:r>
-            <a:rPr lang="de-DE" sz="1600" kern="1200" dirty="0" err="1"/>
-            <a:t>function</a:t>
-          </a:r>
-          <a:r>
-            <a:rPr lang="de-DE" sz="1600" kern="1200" dirty="0"/>
+            <a:rPr lang="de-DE" sz="2100" kern="1200" dirty="0" err="1"/>
+            <a:t>Application</a:t>
+          </a:r>
+          <a:r>
+            <a:rPr lang="de-DE" sz="2100" kern="1200" dirty="0"/>
             <a:t> </a:t>
           </a:r>
           <a:r>
-            <a:rPr lang="de-DE" sz="1600" kern="1200" dirty="0" err="1"/>
-            <a:t>with</a:t>
-          </a:r>
-          <a:r>
-            <a:rPr lang="de-DE" sz="1600" kern="1200" dirty="0"/>
-            <a:t> </a:t>
-          </a:r>
-          <a:r>
-            <a:rPr lang="de-DE" sz="1600" kern="1200" dirty="0" err="1"/>
-            <a:t>the</a:t>
-          </a:r>
-          <a:r>
-            <a:rPr lang="de-DE" sz="1600" kern="1200" dirty="0"/>
-            <a:t> „</a:t>
-          </a:r>
-          <a:r>
-            <a:rPr lang="de-DE" sz="1600" kern="1200" dirty="0" err="1"/>
-            <a:t>customParams</a:t>
-          </a:r>
-          <a:r>
-            <a:rPr lang="de-DE" sz="1600" kern="1200" dirty="0"/>
-            <a:t>“ </a:t>
-          </a:r>
-          <a:r>
-            <a:rPr lang="de-DE" sz="1600" kern="1200" dirty="0" err="1"/>
-            <a:t>argument</a:t>
-          </a:r>
-          <a:endParaRPr lang="de-DE" sz="1600" kern="1200" dirty="0"/>
+            <a:rPr lang="de-DE" sz="2100" kern="1200" dirty="0" err="1"/>
+            <a:t>protocol</a:t>
+          </a:r>
+          <a:endParaRPr lang="de-DE" sz="2100" kern="1200" dirty="0"/>
         </a:p>
       </dsp:txBody>
       <dsp:txXfrm>
-        <a:off x="2587509" y="4522891"/>
-        <a:ext cx="2952981" cy="705329"/>
-      </dsp:txXfrm>
-    </dsp:sp>
-    <dsp:sp modelId="{9BA57664-CD12-4F05-BF31-8399FF3938EE}">
-      <dsp:nvSpPr>
-        <dsp:cNvPr id="0" name=""/>
-        <dsp:cNvSpPr/>
-      </dsp:nvSpPr>
-      <dsp:spPr>
-        <a:xfrm rot="5400000">
-          <a:off x="3923521" y="5268894"/>
-          <a:ext cx="280956" cy="337147"/>
-        </a:xfrm>
-        <a:prstGeom prst="rightArrow">
-          <a:avLst>
-            <a:gd name="adj1" fmla="val 60000"/>
-            <a:gd name="adj2" fmla="val 50000"/>
-          </a:avLst>
-        </a:prstGeom>
-        <a:solidFill>
-          <a:schemeClr val="accent1">
-            <a:tint val="60000"/>
-            <a:hueOff val="0"/>
-            <a:satOff val="0"/>
-            <a:lumOff val="0"/>
-            <a:alphaOff val="0"/>
-          </a:schemeClr>
-        </a:solidFill>
-        <a:ln>
-          <a:noFill/>
-        </a:ln>
-        <a:effectLst/>
-      </dsp:spPr>
-      <dsp:style>
-        <a:lnRef idx="0">
-          <a:scrgbClr r="0" g="0" b="0"/>
-        </a:lnRef>
-        <a:fillRef idx="1">
-          <a:scrgbClr r="0" g="0" b="0"/>
-        </a:fillRef>
-        <a:effectRef idx="0">
-          <a:scrgbClr r="0" g="0" b="0"/>
-        </a:effectRef>
-        <a:fontRef idx="minor">
-          <a:schemeClr val="lt1"/>
-        </a:fontRef>
-      </dsp:style>
-      <dsp:txBody>
-        <a:bodyPr spcFirstLastPara="0" vert="horz" wrap="square" lIns="0" tIns="0" rIns="0" bIns="0" numCol="1" spcCol="1270" anchor="ctr" anchorCtr="0">
-          <a:noAutofit/>
-        </a:bodyPr>
-        <a:lstStyle/>
-        <a:p>
-          <a:pPr marL="0" lvl="0" indent="0" algn="ctr" defTabSz="622300">
-            <a:lnSpc>
-              <a:spcPct val="90000"/>
-            </a:lnSpc>
-            <a:spcBef>
-              <a:spcPct val="0"/>
-            </a:spcBef>
-            <a:spcAft>
-              <a:spcPct val="35000"/>
-            </a:spcAft>
-            <a:buNone/>
-          </a:pPr>
-          <a:endParaRPr lang="en-US" sz="1400" kern="1200"/>
-        </a:p>
-      </dsp:txBody>
-      <dsp:txXfrm rot="-5400000">
-        <a:off x="3962855" y="5296990"/>
-        <a:ext cx="202289" cy="196669"/>
-      </dsp:txXfrm>
-    </dsp:sp>
-    <dsp:sp modelId="{6F905638-7C0C-4414-A139-2B2E5BFB3BD8}">
-      <dsp:nvSpPr>
-        <dsp:cNvPr id="0" name=""/>
-        <dsp:cNvSpPr/>
-      </dsp:nvSpPr>
-      <dsp:spPr>
-        <a:xfrm>
-          <a:off x="2565565" y="5624773"/>
-          <a:ext cx="2996869" cy="749217"/>
-        </a:xfrm>
-        <a:prstGeom prst="roundRect">
-          <a:avLst>
-            <a:gd name="adj" fmla="val 10000"/>
-          </a:avLst>
-        </a:prstGeom>
-        <a:solidFill>
-          <a:schemeClr val="accent1">
-            <a:hueOff val="0"/>
-            <a:satOff val="0"/>
-            <a:lumOff val="0"/>
-            <a:alphaOff val="0"/>
-          </a:schemeClr>
-        </a:solidFill>
-        <a:ln w="12700" cap="flat" cmpd="sng" algn="ctr">
-          <a:solidFill>
-            <a:schemeClr val="lt1">
-              <a:hueOff val="0"/>
-              <a:satOff val="0"/>
-              <a:lumOff val="0"/>
-              <a:alphaOff val="0"/>
-            </a:schemeClr>
-          </a:solidFill>
-          <a:prstDash val="solid"/>
-          <a:miter lim="800000"/>
-        </a:ln>
-        <a:effectLst/>
-      </dsp:spPr>
-      <dsp:style>
-        <a:lnRef idx="2">
-          <a:scrgbClr r="0" g="0" b="0"/>
-        </a:lnRef>
-        <a:fillRef idx="1">
-          <a:scrgbClr r="0" g="0" b="0"/>
-        </a:fillRef>
-        <a:effectRef idx="0">
-          <a:scrgbClr r="0" g="0" b="0"/>
-        </a:effectRef>
-        <a:fontRef idx="minor">
-          <a:schemeClr val="lt1"/>
-        </a:fontRef>
-      </dsp:style>
-      <dsp:txBody>
-        <a:bodyPr spcFirstLastPara="0" vert="horz" wrap="square" lIns="72390" tIns="72390" rIns="72390" bIns="72390" numCol="1" spcCol="1270" anchor="ctr" anchorCtr="0">
-          <a:noAutofit/>
-        </a:bodyPr>
-        <a:lstStyle/>
-        <a:p>
-          <a:pPr marL="0" lvl="0" indent="0" algn="ctr" defTabSz="844550">
-            <a:lnSpc>
-              <a:spcPct val="90000"/>
-            </a:lnSpc>
-            <a:spcBef>
-              <a:spcPct val="0"/>
-            </a:spcBef>
-            <a:spcAft>
-              <a:spcPct val="35000"/>
-            </a:spcAft>
-            <a:buNone/>
-          </a:pPr>
-          <a:r>
-            <a:rPr lang="de-DE" sz="1900" kern="1200" dirty="0"/>
-            <a:t>Parameters </a:t>
-          </a:r>
-          <a:r>
-            <a:rPr lang="de-DE" sz="1900" kern="1200" dirty="0" err="1"/>
-            <a:t>defined</a:t>
-          </a:r>
-          <a:r>
-            <a:rPr lang="de-DE" sz="1900" kern="1200" dirty="0"/>
-            <a:t> in </a:t>
-          </a:r>
-          <a:r>
-            <a:rPr lang="de-DE" sz="1900" kern="1200" dirty="0" err="1"/>
-            <a:t>the</a:t>
-          </a:r>
-          <a:r>
-            <a:rPr lang="de-DE" sz="1900" kern="1200" dirty="0"/>
-            <a:t> </a:t>
-          </a:r>
-          <a:r>
-            <a:rPr lang="de-DE" sz="1900" kern="1200" dirty="0" err="1"/>
-            <a:t>Application</a:t>
-          </a:r>
-          <a:r>
-            <a:rPr lang="de-DE" sz="1900" kern="1200" dirty="0"/>
-            <a:t> </a:t>
-          </a:r>
-          <a:r>
-            <a:rPr lang="de-DE" sz="1900" kern="1200" dirty="0" err="1"/>
-            <a:t>protocol</a:t>
-          </a:r>
-          <a:endParaRPr lang="de-DE" sz="1900" kern="1200" dirty="0"/>
-        </a:p>
-      </dsp:txBody>
-      <dsp:txXfrm>
-        <a:off x="2587509" y="5646717"/>
-        <a:ext cx="2952981" cy="705329"/>
+        <a:off x="2612909" y="5494388"/>
+        <a:ext cx="2902181" cy="857779"/>
       </dsp:txXfrm>
     </dsp:sp>
   </dsp:spTree>
@@ -9264,7 +8991,7 @@
           <a:p>
             <a:fld id="{B199164D-C87C-46DA-8BA8-D57C4A9AE1EA}" type="datetimeFigureOut">
               <a:rPr lang="en-US" smtClean="0"/>
-              <a:t>4/25/2023</a:t>
+              <a:t>4/26/2023</a:t>
             </a:fld>
             <a:endParaRPr lang="en-US"/>
           </a:p>
@@ -9462,7 +9189,7 @@
           <a:p>
             <a:fld id="{B199164D-C87C-46DA-8BA8-D57C4A9AE1EA}" type="datetimeFigureOut">
               <a:rPr lang="en-US" smtClean="0"/>
-              <a:t>4/25/2023</a:t>
+              <a:t>4/26/2023</a:t>
             </a:fld>
             <a:endParaRPr lang="en-US"/>
           </a:p>
@@ -9670,7 +9397,7 @@
           <a:p>
             <a:fld id="{B199164D-C87C-46DA-8BA8-D57C4A9AE1EA}" type="datetimeFigureOut">
               <a:rPr lang="en-US" smtClean="0"/>
-              <a:t>4/25/2023</a:t>
+              <a:t>4/26/2023</a:t>
             </a:fld>
             <a:endParaRPr lang="en-US"/>
           </a:p>
@@ -9868,7 +9595,7 @@
           <a:p>
             <a:fld id="{B199164D-C87C-46DA-8BA8-D57C4A9AE1EA}" type="datetimeFigureOut">
               <a:rPr lang="en-US" smtClean="0"/>
-              <a:t>4/25/2023</a:t>
+              <a:t>4/26/2023</a:t>
             </a:fld>
             <a:endParaRPr lang="en-US"/>
           </a:p>
@@ -10143,7 +9870,7 @@
           <a:p>
             <a:fld id="{B199164D-C87C-46DA-8BA8-D57C4A9AE1EA}" type="datetimeFigureOut">
               <a:rPr lang="en-US" smtClean="0"/>
-              <a:t>4/25/2023</a:t>
+              <a:t>4/26/2023</a:t>
             </a:fld>
             <a:endParaRPr lang="en-US"/>
           </a:p>
@@ -10408,7 +10135,7 @@
           <a:p>
             <a:fld id="{B199164D-C87C-46DA-8BA8-D57C4A9AE1EA}" type="datetimeFigureOut">
               <a:rPr lang="en-US" smtClean="0"/>
-              <a:t>4/25/2023</a:t>
+              <a:t>4/26/2023</a:t>
             </a:fld>
             <a:endParaRPr lang="en-US"/>
           </a:p>
@@ -10820,7 +10547,7 @@
           <a:p>
             <a:fld id="{B199164D-C87C-46DA-8BA8-D57C4A9AE1EA}" type="datetimeFigureOut">
               <a:rPr lang="en-US" smtClean="0"/>
-              <a:t>4/25/2023</a:t>
+              <a:t>4/26/2023</a:t>
             </a:fld>
             <a:endParaRPr lang="en-US"/>
           </a:p>
@@ -10961,7 +10688,7 @@
           <a:p>
             <a:fld id="{B199164D-C87C-46DA-8BA8-D57C4A9AE1EA}" type="datetimeFigureOut">
               <a:rPr lang="en-US" smtClean="0"/>
-              <a:t>4/25/2023</a:t>
+              <a:t>4/26/2023</a:t>
             </a:fld>
             <a:endParaRPr lang="en-US"/>
           </a:p>
@@ -11074,7 +10801,7 @@
           <a:p>
             <a:fld id="{B199164D-C87C-46DA-8BA8-D57C4A9AE1EA}" type="datetimeFigureOut">
               <a:rPr lang="en-US" smtClean="0"/>
-              <a:t>4/25/2023</a:t>
+              <a:t>4/26/2023</a:t>
             </a:fld>
             <a:endParaRPr lang="en-US"/>
           </a:p>
@@ -11385,7 +11112,7 @@
           <a:p>
             <a:fld id="{B199164D-C87C-46DA-8BA8-D57C4A9AE1EA}" type="datetimeFigureOut">
               <a:rPr lang="en-US" smtClean="0"/>
-              <a:t>4/25/2023</a:t>
+              <a:t>4/26/2023</a:t>
             </a:fld>
             <a:endParaRPr lang="en-US"/>
           </a:p>
@@ -11673,7 +11400,7 @@
           <a:p>
             <a:fld id="{B199164D-C87C-46DA-8BA8-D57C4A9AE1EA}" type="datetimeFigureOut">
               <a:rPr lang="en-US" smtClean="0"/>
-              <a:t>4/25/2023</a:t>
+              <a:t>4/26/2023</a:t>
             </a:fld>
             <a:endParaRPr lang="en-US"/>
           </a:p>
@@ -11914,7 +11641,7 @@
           <a:p>
             <a:fld id="{B199164D-C87C-46DA-8BA8-D57C4A9AE1EA}" type="datetimeFigureOut">
               <a:rPr lang="en-US" smtClean="0"/>
-              <a:t>4/25/2023</a:t>
+              <a:t>4/26/2023</a:t>
             </a:fld>
             <a:endParaRPr lang="en-US"/>
           </a:p>
@@ -12876,7 +12603,7 @@
           <p:nvPr>
             <p:extLst>
               <p:ext uri="{D42A27DB-BD31-4B8C-83A1-F6EECF244321}">
-                <p14:modId xmlns:p14="http://schemas.microsoft.com/office/powerpoint/2010/main" val="1460372829"/>
+                <p14:modId xmlns:p14="http://schemas.microsoft.com/office/powerpoint/2010/main" val="4042890966"/>
               </p:ext>
             </p:extLst>
           </p:nvPr>

</xml_diff>

<commit_message>
Separate scenario initialization from actual running (#441)
* Workflow changed to:
 1. Create `ScenarioConfiguration`
 2. Create `Scenario`
 3. Run `Scenario`

- New class `Scenario`
- New function `createScenarios()` that creates `Scenario` objects from `ScenarioConfiguration`
- `runScenarios()` requires `Scenario` objects
- `setTestParameters` has been removed from `ScenarioConfiguration`. All additional parameters must be supplied by `customParams` argument to `createScenarios()`
- `simulationRunOptions` is not a part of `ScenarioConfiguration` but an argument of `runScenarios()`
- Custom functions to simulations are not supported any more, as direct access to the `Simulation` object is possible through `Scenario` objects

- Function `initializeScenario()` removed.
- Function `setApplications()` is deprecated.

* Replace for-loop with purrr::map()
</commit_message>
<xml_diff>
--- a/Workflow_scheme.pptx
+++ b/Workflow_scheme.pptx
@@ -3359,7 +3359,7 @@
         </a:p>
       </dgm:t>
     </dgm:pt>
-    <dgm:pt modelId="{904A5E4D-E340-444D-A17E-D26A08D4D0CA}">
+    <dgm:pt modelId="{91FC2AB7-B1E8-4D87-AF6A-71E755A3CAA2}">
       <dgm:prSet phldrT="[Text]" custT="1"/>
       <dgm:spPr/>
       <dgm:t>
@@ -3372,11 +3372,43 @@
           </a:r>
           <a:r>
             <a:rPr lang="de-DE" sz="1600" dirty="0" err="1"/>
-            <a:t>defined</a:t>
+            <a:t>passed</a:t>
           </a:r>
           <a:r>
             <a:rPr lang="de-DE" sz="1600" dirty="0"/>
-            <a:t> in </a:t>
+            <a:t> </a:t>
+          </a:r>
+          <a:r>
+            <a:rPr lang="de-DE" sz="1600" dirty="0" err="1"/>
+            <a:t>to</a:t>
+          </a:r>
+          <a:r>
+            <a:rPr lang="de-DE" sz="1600" dirty="0"/>
+            <a:t> „</a:t>
+          </a:r>
+          <a:r>
+            <a:rPr lang="de-DE" sz="1600" dirty="0" err="1"/>
+            <a:t>runScenarios</a:t>
+          </a:r>
+          <a:r>
+            <a:rPr lang="de-DE" sz="1600" dirty="0"/>
+            <a:t>()“ </a:t>
+          </a:r>
+          <a:r>
+            <a:rPr lang="de-DE" sz="1600" dirty="0" err="1"/>
+            <a:t>function</a:t>
+          </a:r>
+          <a:r>
+            <a:rPr lang="de-DE" sz="1600" dirty="0"/>
+            <a:t> </a:t>
+          </a:r>
+          <a:r>
+            <a:rPr lang="de-DE" sz="1600" dirty="0" err="1"/>
+            <a:t>with</a:t>
+          </a:r>
+          <a:r>
+            <a:rPr lang="de-DE" sz="1600" dirty="0"/>
+            <a:t> </a:t>
           </a:r>
           <a:r>
             <a:rPr lang="de-DE" sz="1600" dirty="0" err="1"/>
@@ -3384,28 +3416,25 @@
           </a:r>
           <a:r>
             <a:rPr lang="de-DE" sz="1600" dirty="0"/>
-            <a:t> „Code/</a:t>
+            <a:t> „</a:t>
           </a:r>
           <a:r>
             <a:rPr lang="de-DE" sz="1600" dirty="0" err="1"/>
-            <a:t>InputCode</a:t>
+            <a:t>customParams</a:t>
           </a:r>
           <a:r>
             <a:rPr lang="de-DE" sz="1600" dirty="0"/>
-            <a:t>/</a:t>
+            <a:t>“ </a:t>
           </a:r>
           <a:r>
             <a:rPr lang="de-DE" sz="1600" dirty="0" err="1"/>
-            <a:t>TestParameters.R</a:t>
-          </a:r>
-          <a:r>
-            <a:rPr lang="de-DE" sz="1600" dirty="0"/>
-            <a:t>“</a:t>
-          </a:r>
+            <a:t>argument</a:t>
+          </a:r>
+          <a:endParaRPr lang="de-DE" sz="1600" dirty="0"/>
         </a:p>
       </dgm:t>
     </dgm:pt>
-    <dgm:pt modelId="{8E3136ED-0CB7-4600-BF24-1FD1CD7E43EA}" type="parTrans" cxnId="{C6B3718C-B4DA-4F52-8997-16313F1728AA}">
+    <dgm:pt modelId="{D6B86AE7-3792-458A-98FF-74E6B591785F}" type="parTrans" cxnId="{D66BDF65-AD23-4328-B996-97D85E65D8D4}">
       <dgm:prSet/>
       <dgm:spPr/>
       <dgm:t>
@@ -3416,93 +3445,7 @@
         </a:p>
       </dgm:t>
     </dgm:pt>
-    <dgm:pt modelId="{84DFCA05-8CD1-4341-901B-BC2EC2304DDB}" type="sibTrans" cxnId="{C6B3718C-B4DA-4F52-8997-16313F1728AA}">
-      <dgm:prSet custT="1"/>
-      <dgm:spPr/>
-      <dgm:t>
-        <a:bodyPr/>
-        <a:lstStyle/>
-        <a:p>
-          <a:endParaRPr lang="en-US" sz="2400"/>
-        </a:p>
-      </dgm:t>
-    </dgm:pt>
-    <dgm:pt modelId="{91FC2AB7-B1E8-4D87-AF6A-71E755A3CAA2}">
-      <dgm:prSet phldrT="[Text]" custT="1"/>
-      <dgm:spPr/>
-      <dgm:t>
-        <a:bodyPr/>
-        <a:lstStyle/>
-        <a:p>
-          <a:r>
-            <a:rPr lang="de-DE" sz="1600" dirty="0"/>
-            <a:t>Parameters </a:t>
-          </a:r>
-          <a:r>
-            <a:rPr lang="de-DE" sz="1600" dirty="0" err="1"/>
-            <a:t>passed</a:t>
-          </a:r>
-          <a:r>
-            <a:rPr lang="de-DE" sz="1600" dirty="0"/>
-            <a:t> </a:t>
-          </a:r>
-          <a:r>
-            <a:rPr lang="de-DE" sz="1600" dirty="0" err="1"/>
-            <a:t>to</a:t>
-          </a:r>
-          <a:r>
-            <a:rPr lang="de-DE" sz="1600" dirty="0"/>
-            <a:t> „</a:t>
-          </a:r>
-          <a:r>
-            <a:rPr lang="de-DE" sz="1600" dirty="0" err="1"/>
-            <a:t>runScenarios</a:t>
-          </a:r>
-          <a:r>
-            <a:rPr lang="de-DE" sz="1600" dirty="0"/>
-            <a:t>()“ </a:t>
-          </a:r>
-          <a:r>
-            <a:rPr lang="de-DE" sz="1600" dirty="0" err="1"/>
-            <a:t>function</a:t>
-          </a:r>
-          <a:r>
-            <a:rPr lang="de-DE" sz="1600" dirty="0"/>
-            <a:t> </a:t>
-          </a:r>
-          <a:r>
-            <a:rPr lang="de-DE" sz="1600" dirty="0" err="1"/>
-            <a:t>with</a:t>
-          </a:r>
-          <a:r>
-            <a:rPr lang="de-DE" sz="1600" dirty="0"/>
-            <a:t> </a:t>
-          </a:r>
-          <a:r>
-            <a:rPr lang="de-DE" sz="1600" dirty="0" err="1"/>
-            <a:t>the</a:t>
-          </a:r>
-          <a:r>
-            <a:rPr lang="de-DE" sz="1600" dirty="0"/>
-            <a:t> „</a:t>
-          </a:r>
-          <a:r>
-            <a:rPr lang="de-DE" sz="1600" dirty="0" err="1"/>
-            <a:t>customParams</a:t>
-          </a:r>
-          <a:r>
-            <a:rPr lang="de-DE" sz="1600" dirty="0"/>
-            <a:t>“ </a:t>
-          </a:r>
-          <a:r>
-            <a:rPr lang="de-DE" sz="1600" dirty="0" err="1"/>
-            <a:t>argument</a:t>
-          </a:r>
-          <a:endParaRPr lang="de-DE" sz="1600" dirty="0"/>
-        </a:p>
-      </dgm:t>
-    </dgm:pt>
-    <dgm:pt modelId="{D6B86AE7-3792-458A-98FF-74E6B591785F}" type="parTrans" cxnId="{D66BDF65-AD23-4328-B996-97D85E65D8D4}">
+    <dgm:pt modelId="{69FE11D4-A6F2-44FB-9706-14C29F2E3AC8}" type="sibTrans" cxnId="{D66BDF65-AD23-4328-B996-97D85E65D8D4}">
       <dgm:prSet/>
       <dgm:spPr/>
       <dgm:t>
@@ -3513,7 +3456,50 @@
         </a:p>
       </dgm:t>
     </dgm:pt>
-    <dgm:pt modelId="{69FE11D4-A6F2-44FB-9706-14C29F2E3AC8}" type="sibTrans" cxnId="{D66BDF65-AD23-4328-B996-97D85E65D8D4}">
+    <dgm:pt modelId="{904D13CF-20B5-45F7-B411-C4B04322AD45}">
+      <dgm:prSet phldrT="[Text]"/>
+      <dgm:spPr/>
+      <dgm:t>
+        <a:bodyPr/>
+        <a:lstStyle/>
+        <a:p>
+          <a:r>
+            <a:rPr lang="de-DE" sz="1400" dirty="0"/>
+            <a:t>Parameters </a:t>
+          </a:r>
+          <a:r>
+            <a:rPr lang="de-DE" sz="1400" dirty="0" err="1"/>
+            <a:t>defined</a:t>
+          </a:r>
+          <a:r>
+            <a:rPr lang="de-DE" sz="1400" dirty="0"/>
+            <a:t> in </a:t>
+          </a:r>
+          <a:r>
+            <a:rPr lang="de-DE" sz="1400" dirty="0" err="1"/>
+            <a:t>the</a:t>
+          </a:r>
+          <a:r>
+            <a:rPr lang="de-DE" sz="1400" dirty="0"/>
+            <a:t> </a:t>
+          </a:r>
+          <a:r>
+            <a:rPr lang="de-DE" sz="1400" dirty="0" err="1"/>
+            <a:t>Application</a:t>
+          </a:r>
+          <a:r>
+            <a:rPr lang="de-DE" sz="1400" dirty="0"/>
+            <a:t> </a:t>
+          </a:r>
+          <a:r>
+            <a:rPr lang="de-DE" sz="1400" dirty="0" err="1"/>
+            <a:t>protocol</a:t>
+          </a:r>
+          <a:endParaRPr lang="de-DE" sz="1400" dirty="0"/>
+        </a:p>
+      </dgm:t>
+    </dgm:pt>
+    <dgm:pt modelId="{99E8C748-AFDC-4A43-B7B7-8C9ABB77872B}" type="parTrans" cxnId="{6ED578E0-0714-4963-AC6F-BA4BCDA4DEDD}">
       <dgm:prSet/>
       <dgm:spPr/>
       <dgm:t>
@@ -3524,50 +3510,7 @@
         </a:p>
       </dgm:t>
     </dgm:pt>
-    <dgm:pt modelId="{904D13CF-20B5-45F7-B411-C4B04322AD45}">
-      <dgm:prSet phldrT="[Text]"/>
-      <dgm:spPr/>
-      <dgm:t>
-        <a:bodyPr/>
-        <a:lstStyle/>
-        <a:p>
-          <a:r>
-            <a:rPr lang="de-DE" sz="1400" dirty="0"/>
-            <a:t>Parameters </a:t>
-          </a:r>
-          <a:r>
-            <a:rPr lang="de-DE" sz="1400" dirty="0" err="1"/>
-            <a:t>defined</a:t>
-          </a:r>
-          <a:r>
-            <a:rPr lang="de-DE" sz="1400" dirty="0"/>
-            <a:t> in </a:t>
-          </a:r>
-          <a:r>
-            <a:rPr lang="de-DE" sz="1400" dirty="0" err="1"/>
-            <a:t>the</a:t>
-          </a:r>
-          <a:r>
-            <a:rPr lang="de-DE" sz="1400" dirty="0"/>
-            <a:t> </a:t>
-          </a:r>
-          <a:r>
-            <a:rPr lang="de-DE" sz="1400" dirty="0" err="1"/>
-            <a:t>Application</a:t>
-          </a:r>
-          <a:r>
-            <a:rPr lang="de-DE" sz="1400" dirty="0"/>
-            <a:t> </a:t>
-          </a:r>
-          <a:r>
-            <a:rPr lang="de-DE" sz="1400" dirty="0" err="1"/>
-            <a:t>protocol</a:t>
-          </a:r>
-          <a:endParaRPr lang="de-DE" sz="1400" dirty="0"/>
-        </a:p>
-      </dgm:t>
-    </dgm:pt>
-    <dgm:pt modelId="{99E8C748-AFDC-4A43-B7B7-8C9ABB77872B}" type="parTrans" cxnId="{6ED578E0-0714-4963-AC6F-BA4BCDA4DEDD}">
+    <dgm:pt modelId="{E8F05EC8-AF1F-4FDC-91AE-4FAE4C0B9391}" type="sibTrans" cxnId="{6ED578E0-0714-4963-AC6F-BA4BCDA4DEDD}">
       <dgm:prSet/>
       <dgm:spPr/>
       <dgm:t>
@@ -3578,17 +3521,6 @@
         </a:p>
       </dgm:t>
     </dgm:pt>
-    <dgm:pt modelId="{E8F05EC8-AF1F-4FDC-91AE-4FAE4C0B9391}" type="sibTrans" cxnId="{6ED578E0-0714-4963-AC6F-BA4BCDA4DEDD}">
-      <dgm:prSet/>
-      <dgm:spPr/>
-      <dgm:t>
-        <a:bodyPr/>
-        <a:lstStyle/>
-        <a:p>
-          <a:endParaRPr lang="en-US"/>
-        </a:p>
-      </dgm:t>
-    </dgm:pt>
     <dgm:pt modelId="{0F8C4796-60B9-44F0-95F7-C8F53E0D6F5B}" type="pres">
       <dgm:prSet presAssocID="{4C6B6F34-EBF2-438E-B3B7-957DBAF6DA06}" presName="linearFlow" presStyleCnt="0">
         <dgm:presLayoutVars>
@@ -3598,7 +3530,7 @@
       <dgm:spPr/>
     </dgm:pt>
     <dgm:pt modelId="{32F3F580-B4AE-4A75-B4D5-199177EDC857}" type="pres">
-      <dgm:prSet presAssocID="{6E63DDAB-E0C7-493D-AA1D-876DA0421EBF}" presName="node" presStyleLbl="node1" presStyleIdx="0" presStyleCnt="6">
+      <dgm:prSet presAssocID="{6E63DDAB-E0C7-493D-AA1D-876DA0421EBF}" presName="node" presStyleLbl="node1" presStyleIdx="0" presStyleCnt="5">
         <dgm:presLayoutVars>
           <dgm:bulletEnabled val="1"/>
         </dgm:presLayoutVars>
@@ -3606,15 +3538,15 @@
       <dgm:spPr/>
     </dgm:pt>
     <dgm:pt modelId="{DE734AF0-F15D-43AA-9AA5-E7449D3D3242}" type="pres">
-      <dgm:prSet presAssocID="{0C0BF99E-58D0-4FAA-A800-B1F81FBC0008}" presName="sibTrans" presStyleLbl="sibTrans2D1" presStyleIdx="0" presStyleCnt="5"/>
+      <dgm:prSet presAssocID="{0C0BF99E-58D0-4FAA-A800-B1F81FBC0008}" presName="sibTrans" presStyleLbl="sibTrans2D1" presStyleIdx="0" presStyleCnt="4"/>
       <dgm:spPr/>
     </dgm:pt>
     <dgm:pt modelId="{5E1CEAA5-0423-4DCA-8EB1-AEC797E763EE}" type="pres">
-      <dgm:prSet presAssocID="{0C0BF99E-58D0-4FAA-A800-B1F81FBC0008}" presName="connectorText" presStyleLbl="sibTrans2D1" presStyleIdx="0" presStyleCnt="5"/>
+      <dgm:prSet presAssocID="{0C0BF99E-58D0-4FAA-A800-B1F81FBC0008}" presName="connectorText" presStyleLbl="sibTrans2D1" presStyleIdx="0" presStyleCnt="4"/>
       <dgm:spPr/>
     </dgm:pt>
     <dgm:pt modelId="{8DB52F31-1B42-4B55-A5C5-93099FA660CA}" type="pres">
-      <dgm:prSet presAssocID="{D9A164A5-C4EE-4E2C-BCB9-FC9B1367C8C9}" presName="node" presStyleLbl="node1" presStyleIdx="1" presStyleCnt="6">
+      <dgm:prSet presAssocID="{D9A164A5-C4EE-4E2C-BCB9-FC9B1367C8C9}" presName="node" presStyleLbl="node1" presStyleIdx="1" presStyleCnt="5">
         <dgm:presLayoutVars>
           <dgm:bulletEnabled val="1"/>
         </dgm:presLayoutVars>
@@ -3622,15 +3554,15 @@
       <dgm:spPr/>
     </dgm:pt>
     <dgm:pt modelId="{D4AF0274-1388-4F6B-8D53-52A6FED89246}" type="pres">
-      <dgm:prSet presAssocID="{3A3A765D-45CB-4909-B3B4-7B9C8089DBBE}" presName="sibTrans" presStyleLbl="sibTrans2D1" presStyleIdx="1" presStyleCnt="5"/>
+      <dgm:prSet presAssocID="{3A3A765D-45CB-4909-B3B4-7B9C8089DBBE}" presName="sibTrans" presStyleLbl="sibTrans2D1" presStyleIdx="1" presStyleCnt="4"/>
       <dgm:spPr/>
     </dgm:pt>
     <dgm:pt modelId="{FA84D1E7-8CF9-4F3E-B109-DBB564D82884}" type="pres">
-      <dgm:prSet presAssocID="{3A3A765D-45CB-4909-B3B4-7B9C8089DBBE}" presName="connectorText" presStyleLbl="sibTrans2D1" presStyleIdx="1" presStyleCnt="5"/>
+      <dgm:prSet presAssocID="{3A3A765D-45CB-4909-B3B4-7B9C8089DBBE}" presName="connectorText" presStyleLbl="sibTrans2D1" presStyleIdx="1" presStyleCnt="4"/>
       <dgm:spPr/>
     </dgm:pt>
     <dgm:pt modelId="{393E3C96-C34C-451A-92F8-886DD2CD2B93}" type="pres">
-      <dgm:prSet presAssocID="{0EA7596A-34F1-4CE4-AD46-2937F6D05F61}" presName="node" presStyleLbl="node1" presStyleIdx="2" presStyleCnt="6">
+      <dgm:prSet presAssocID="{0EA7596A-34F1-4CE4-AD46-2937F6D05F61}" presName="node" presStyleLbl="node1" presStyleIdx="2" presStyleCnt="5">
         <dgm:presLayoutVars>
           <dgm:bulletEnabled val="1"/>
         </dgm:presLayoutVars>
@@ -3638,75 +3570,55 @@
       <dgm:spPr/>
     </dgm:pt>
     <dgm:pt modelId="{018C7C0E-1BF5-4952-ACA5-977E53384722}" type="pres">
-      <dgm:prSet presAssocID="{E3006435-1BF9-4FD6-9C31-7ED4490DE600}" presName="sibTrans" presStyleLbl="sibTrans2D1" presStyleIdx="2" presStyleCnt="5"/>
+      <dgm:prSet presAssocID="{E3006435-1BF9-4FD6-9C31-7ED4490DE600}" presName="sibTrans" presStyleLbl="sibTrans2D1" presStyleIdx="2" presStyleCnt="4"/>
       <dgm:spPr/>
     </dgm:pt>
     <dgm:pt modelId="{9A6F0891-C47C-4E2B-BFC4-7050A71F9598}" type="pres">
-      <dgm:prSet presAssocID="{E3006435-1BF9-4FD6-9C31-7ED4490DE600}" presName="connectorText" presStyleLbl="sibTrans2D1" presStyleIdx="2" presStyleCnt="5"/>
-      <dgm:spPr/>
-    </dgm:pt>
-    <dgm:pt modelId="{3C8485D3-5E38-4106-AB35-87DD069A821F}" type="pres">
-      <dgm:prSet presAssocID="{904A5E4D-E340-444D-A17E-D26A08D4D0CA}" presName="node" presStyleLbl="node1" presStyleIdx="3" presStyleCnt="6">
+      <dgm:prSet presAssocID="{E3006435-1BF9-4FD6-9C31-7ED4490DE600}" presName="connectorText" presStyleLbl="sibTrans2D1" presStyleIdx="2" presStyleCnt="4"/>
+      <dgm:spPr/>
+    </dgm:pt>
+    <dgm:pt modelId="{164DDEB3-DF6D-4D8A-AB77-57CE925C2E9F}" type="pres">
+      <dgm:prSet presAssocID="{91FC2AB7-B1E8-4D87-AF6A-71E755A3CAA2}" presName="node" presStyleLbl="node1" presStyleIdx="3" presStyleCnt="5">
         <dgm:presLayoutVars>
           <dgm:bulletEnabled val="1"/>
         </dgm:presLayoutVars>
       </dgm:prSet>
       <dgm:spPr/>
     </dgm:pt>
-    <dgm:pt modelId="{648E255A-B01E-4EFD-BD53-6C00B2E025D5}" type="pres">
-      <dgm:prSet presAssocID="{84DFCA05-8CD1-4341-901B-BC2EC2304DDB}" presName="sibTrans" presStyleLbl="sibTrans2D1" presStyleIdx="3" presStyleCnt="5"/>
-      <dgm:spPr/>
-    </dgm:pt>
-    <dgm:pt modelId="{A925C887-9070-437F-84BF-13625E2D8C00}" type="pres">
-      <dgm:prSet presAssocID="{84DFCA05-8CD1-4341-901B-BC2EC2304DDB}" presName="connectorText" presStyleLbl="sibTrans2D1" presStyleIdx="3" presStyleCnt="5"/>
-      <dgm:spPr/>
-    </dgm:pt>
-    <dgm:pt modelId="{164DDEB3-DF6D-4D8A-AB77-57CE925C2E9F}" type="pres">
-      <dgm:prSet presAssocID="{91FC2AB7-B1E8-4D87-AF6A-71E755A3CAA2}" presName="node" presStyleLbl="node1" presStyleIdx="4" presStyleCnt="6">
+    <dgm:pt modelId="{9BA57664-CD12-4F05-BF31-8399FF3938EE}" type="pres">
+      <dgm:prSet presAssocID="{69FE11D4-A6F2-44FB-9706-14C29F2E3AC8}" presName="sibTrans" presStyleLbl="sibTrans2D1" presStyleIdx="3" presStyleCnt="4"/>
+      <dgm:spPr/>
+    </dgm:pt>
+    <dgm:pt modelId="{C5DEC020-9475-4AE8-B5C4-B31F7E4BC4BF}" type="pres">
+      <dgm:prSet presAssocID="{69FE11D4-A6F2-44FB-9706-14C29F2E3AC8}" presName="connectorText" presStyleLbl="sibTrans2D1" presStyleIdx="3" presStyleCnt="4"/>
+      <dgm:spPr/>
+    </dgm:pt>
+    <dgm:pt modelId="{6F905638-7C0C-4414-A139-2B2E5BFB3BD8}" type="pres">
+      <dgm:prSet presAssocID="{904D13CF-20B5-45F7-B411-C4B04322AD45}" presName="node" presStyleLbl="node1" presStyleIdx="4" presStyleCnt="5">
         <dgm:presLayoutVars>
           <dgm:bulletEnabled val="1"/>
         </dgm:presLayoutVars>
       </dgm:prSet>
       <dgm:spPr/>
     </dgm:pt>
-    <dgm:pt modelId="{9BA57664-CD12-4F05-BF31-8399FF3938EE}" type="pres">
-      <dgm:prSet presAssocID="{69FE11D4-A6F2-44FB-9706-14C29F2E3AC8}" presName="sibTrans" presStyleLbl="sibTrans2D1" presStyleIdx="4" presStyleCnt="5"/>
-      <dgm:spPr/>
-    </dgm:pt>
-    <dgm:pt modelId="{C5DEC020-9475-4AE8-B5C4-B31F7E4BC4BF}" type="pres">
-      <dgm:prSet presAssocID="{69FE11D4-A6F2-44FB-9706-14C29F2E3AC8}" presName="connectorText" presStyleLbl="sibTrans2D1" presStyleIdx="4" presStyleCnt="5"/>
-      <dgm:spPr/>
-    </dgm:pt>
-    <dgm:pt modelId="{6F905638-7C0C-4414-A139-2B2E5BFB3BD8}" type="pres">
-      <dgm:prSet presAssocID="{904D13CF-20B5-45F7-B411-C4B04322AD45}" presName="node" presStyleLbl="node1" presStyleIdx="5" presStyleCnt="6">
-        <dgm:presLayoutVars>
-          <dgm:bulletEnabled val="1"/>
-        </dgm:presLayoutVars>
-      </dgm:prSet>
-      <dgm:spPr/>
-    </dgm:pt>
   </dgm:ptLst>
   <dgm:cxnLst>
     <dgm:cxn modelId="{F97F7400-5F3F-4511-99AF-C09BD42FD039}" type="presOf" srcId="{E3006435-1BF9-4FD6-9C31-7ED4490DE600}" destId="{9A6F0891-C47C-4E2B-BFC4-7050A71F9598}" srcOrd="1" destOrd="0" presId="urn:microsoft.com/office/officeart/2005/8/layout/process2"/>
     <dgm:cxn modelId="{DD444703-08F9-4BBF-AC2A-0976E6EAA556}" srcId="{4C6B6F34-EBF2-438E-B3B7-957DBAF6DA06}" destId="{0EA7596A-34F1-4CE4-AD46-2937F6D05F61}" srcOrd="2" destOrd="0" parTransId="{F43BB90B-B156-42E6-9B7C-9F90F9B30A68}" sibTransId="{E3006435-1BF9-4FD6-9C31-7ED4490DE600}"/>
-    <dgm:cxn modelId="{0A9ED107-5EF4-4BED-ACB6-02FA1F2A5727}" type="presOf" srcId="{84DFCA05-8CD1-4341-901B-BC2EC2304DDB}" destId="{A925C887-9070-437F-84BF-13625E2D8C00}" srcOrd="1" destOrd="0" presId="urn:microsoft.com/office/officeart/2005/8/layout/process2"/>
     <dgm:cxn modelId="{085A1E0C-FAE9-4517-BEB5-3719AAFE0535}" type="presOf" srcId="{3A3A765D-45CB-4909-B3B4-7B9C8089DBBE}" destId="{D4AF0274-1388-4F6B-8D53-52A6FED89246}" srcOrd="0" destOrd="0" presId="urn:microsoft.com/office/officeart/2005/8/layout/process2"/>
     <dgm:cxn modelId="{58FFE822-79DD-45BE-A39D-0AEC2D33D243}" type="presOf" srcId="{D9A164A5-C4EE-4E2C-BCB9-FC9B1367C8C9}" destId="{8DB52F31-1B42-4B55-A5C5-93099FA660CA}" srcOrd="0" destOrd="0" presId="urn:microsoft.com/office/officeart/2005/8/layout/process2"/>
     <dgm:cxn modelId="{3B417F30-F813-4EA9-B108-43EF204F7770}" type="presOf" srcId="{0C0BF99E-58D0-4FAA-A800-B1F81FBC0008}" destId="{DE734AF0-F15D-43AA-9AA5-E7449D3D3242}" srcOrd="0" destOrd="0" presId="urn:microsoft.com/office/officeart/2005/8/layout/process2"/>
     <dgm:cxn modelId="{F0B6D332-99FB-4164-A8B7-AB0DED1125E0}" srcId="{4C6B6F34-EBF2-438E-B3B7-957DBAF6DA06}" destId="{6E63DDAB-E0C7-493D-AA1D-876DA0421EBF}" srcOrd="0" destOrd="0" parTransId="{0F29EA39-47A9-456B-B289-6276254019D4}" sibTransId="{0C0BF99E-58D0-4FAA-A800-B1F81FBC0008}"/>
     <dgm:cxn modelId="{7DF06565-05CB-4B0F-BBA8-F00B84787873}" type="presOf" srcId="{91FC2AB7-B1E8-4D87-AF6A-71E755A3CAA2}" destId="{164DDEB3-DF6D-4D8A-AB77-57CE925C2E9F}" srcOrd="0" destOrd="0" presId="urn:microsoft.com/office/officeart/2005/8/layout/process2"/>
-    <dgm:cxn modelId="{D66BDF65-AD23-4328-B996-97D85E65D8D4}" srcId="{4C6B6F34-EBF2-438E-B3B7-957DBAF6DA06}" destId="{91FC2AB7-B1E8-4D87-AF6A-71E755A3CAA2}" srcOrd="4" destOrd="0" parTransId="{D6B86AE7-3792-458A-98FF-74E6B591785F}" sibTransId="{69FE11D4-A6F2-44FB-9706-14C29F2E3AC8}"/>
+    <dgm:cxn modelId="{D66BDF65-AD23-4328-B996-97D85E65D8D4}" srcId="{4C6B6F34-EBF2-438E-B3B7-957DBAF6DA06}" destId="{91FC2AB7-B1E8-4D87-AF6A-71E755A3CAA2}" srcOrd="3" destOrd="0" parTransId="{D6B86AE7-3792-458A-98FF-74E6B591785F}" sibTransId="{69FE11D4-A6F2-44FB-9706-14C29F2E3AC8}"/>
     <dgm:cxn modelId="{041BE877-F74B-4506-8223-BAA0514CDF4F}" type="presOf" srcId="{4C6B6F34-EBF2-438E-B3B7-957DBAF6DA06}" destId="{0F8C4796-60B9-44F0-95F7-C8F53E0D6F5B}" srcOrd="0" destOrd="0" presId="urn:microsoft.com/office/officeart/2005/8/layout/process2"/>
     <dgm:cxn modelId="{9505A47A-7635-4F9C-ACDD-8AAC4600A121}" type="presOf" srcId="{69FE11D4-A6F2-44FB-9706-14C29F2E3AC8}" destId="{C5DEC020-9475-4AE8-B5C4-B31F7E4BC4BF}" srcOrd="1" destOrd="0" presId="urn:microsoft.com/office/officeart/2005/8/layout/process2"/>
     <dgm:cxn modelId="{13FCCE7E-9669-4D5E-95D5-2B01BD92A353}" type="presOf" srcId="{0C0BF99E-58D0-4FAA-A800-B1F81FBC0008}" destId="{5E1CEAA5-0423-4DCA-8EB1-AEC797E763EE}" srcOrd="1" destOrd="0" presId="urn:microsoft.com/office/officeart/2005/8/layout/process2"/>
-    <dgm:cxn modelId="{C6B3718C-B4DA-4F52-8997-16313F1728AA}" srcId="{4C6B6F34-EBF2-438E-B3B7-957DBAF6DA06}" destId="{904A5E4D-E340-444D-A17E-D26A08D4D0CA}" srcOrd="3" destOrd="0" parTransId="{8E3136ED-0CB7-4600-BF24-1FD1CD7E43EA}" sibTransId="{84DFCA05-8CD1-4341-901B-BC2EC2304DDB}"/>
     <dgm:cxn modelId="{727F38CF-C7C3-47A9-8F05-5B2A08850324}" type="presOf" srcId="{E3006435-1BF9-4FD6-9C31-7ED4490DE600}" destId="{018C7C0E-1BF5-4952-ACA5-977E53384722}" srcOrd="0" destOrd="0" presId="urn:microsoft.com/office/officeart/2005/8/layout/process2"/>
     <dgm:cxn modelId="{9DDAD1D2-B693-448D-AA4B-57AF44DAAFE5}" type="presOf" srcId="{3A3A765D-45CB-4909-B3B4-7B9C8089DBBE}" destId="{FA84D1E7-8CF9-4F3E-B109-DBB564D82884}" srcOrd="1" destOrd="0" presId="urn:microsoft.com/office/officeart/2005/8/layout/process2"/>
-    <dgm:cxn modelId="{9705BAD3-7F2D-4241-92F2-BB840FE574C1}" type="presOf" srcId="{84DFCA05-8CD1-4341-901B-BC2EC2304DDB}" destId="{648E255A-B01E-4EFD-BD53-6C00B2E025D5}" srcOrd="0" destOrd="0" presId="urn:microsoft.com/office/officeart/2005/8/layout/process2"/>
     <dgm:cxn modelId="{0642FAD5-29D0-4E72-AB17-3364D2E947FE}" type="presOf" srcId="{904D13CF-20B5-45F7-B411-C4B04322AD45}" destId="{6F905638-7C0C-4414-A139-2B2E5BFB3BD8}" srcOrd="0" destOrd="0" presId="urn:microsoft.com/office/officeart/2005/8/layout/process2"/>
-    <dgm:cxn modelId="{6ED578E0-0714-4963-AC6F-BA4BCDA4DEDD}" srcId="{4C6B6F34-EBF2-438E-B3B7-957DBAF6DA06}" destId="{904D13CF-20B5-45F7-B411-C4B04322AD45}" srcOrd="5" destOrd="0" parTransId="{99E8C748-AFDC-4A43-B7B7-8C9ABB77872B}" sibTransId="{E8F05EC8-AF1F-4FDC-91AE-4FAE4C0B9391}"/>
+    <dgm:cxn modelId="{6ED578E0-0714-4963-AC6F-BA4BCDA4DEDD}" srcId="{4C6B6F34-EBF2-438E-B3B7-957DBAF6DA06}" destId="{904D13CF-20B5-45F7-B411-C4B04322AD45}" srcOrd="4" destOrd="0" parTransId="{99E8C748-AFDC-4A43-B7B7-8C9ABB77872B}" sibTransId="{E8F05EC8-AF1F-4FDC-91AE-4FAE4C0B9391}"/>
     <dgm:cxn modelId="{84DA56E3-F24E-4F53-AD97-DB23D066A087}" type="presOf" srcId="{0EA7596A-34F1-4CE4-AD46-2937F6D05F61}" destId="{393E3C96-C34C-451A-92F8-886DD2CD2B93}" srcOrd="0" destOrd="0" presId="urn:microsoft.com/office/officeart/2005/8/layout/process2"/>
-    <dgm:cxn modelId="{6F71FCEA-ED53-4B1E-8280-7E0FE3A0F484}" type="presOf" srcId="{904A5E4D-E340-444D-A17E-D26A08D4D0CA}" destId="{3C8485D3-5E38-4106-AB35-87DD069A821F}" srcOrd="0" destOrd="0" presId="urn:microsoft.com/office/officeart/2005/8/layout/process2"/>
     <dgm:cxn modelId="{5D3071EB-87D3-4049-85C8-C8C2CA8C9DA1}" type="presOf" srcId="{69FE11D4-A6F2-44FB-9706-14C29F2E3AC8}" destId="{9BA57664-CD12-4F05-BF31-8399FF3938EE}" srcOrd="0" destOrd="0" presId="urn:microsoft.com/office/officeart/2005/8/layout/process2"/>
     <dgm:cxn modelId="{923B37EE-D128-4A8A-84A7-FA079699B387}" type="presOf" srcId="{6E63DDAB-E0C7-493D-AA1D-876DA0421EBF}" destId="{32F3F580-B4AE-4A75-B4D5-199177EDC857}" srcOrd="0" destOrd="0" presId="urn:microsoft.com/office/officeart/2005/8/layout/process2"/>
     <dgm:cxn modelId="{256209F6-6CBC-4B7E-B7FD-2B6C071D798B}" srcId="{4C6B6F34-EBF2-438E-B3B7-957DBAF6DA06}" destId="{D9A164A5-C4EE-4E2C-BCB9-FC9B1367C8C9}" srcOrd="1" destOrd="0" parTransId="{4AA0B12F-FC0A-441A-8E6D-B24937D51028}" sibTransId="{3A3A765D-45CB-4909-B3B4-7B9C8089DBBE}"/>
@@ -3719,13 +3631,10 @@
     <dgm:cxn modelId="{9DD2B436-5F21-4E06-AEA8-F4763CC1FC3A}" type="presParOf" srcId="{0F8C4796-60B9-44F0-95F7-C8F53E0D6F5B}" destId="{393E3C96-C34C-451A-92F8-886DD2CD2B93}" srcOrd="4" destOrd="0" presId="urn:microsoft.com/office/officeart/2005/8/layout/process2"/>
     <dgm:cxn modelId="{079CEB64-8379-4B4B-8CD1-1E1313245DFE}" type="presParOf" srcId="{0F8C4796-60B9-44F0-95F7-C8F53E0D6F5B}" destId="{018C7C0E-1BF5-4952-ACA5-977E53384722}" srcOrd="5" destOrd="0" presId="urn:microsoft.com/office/officeart/2005/8/layout/process2"/>
     <dgm:cxn modelId="{E2AEF74D-31B1-451D-9D8E-B03F88929D0F}" type="presParOf" srcId="{018C7C0E-1BF5-4952-ACA5-977E53384722}" destId="{9A6F0891-C47C-4E2B-BFC4-7050A71F9598}" srcOrd="0" destOrd="0" presId="urn:microsoft.com/office/officeart/2005/8/layout/process2"/>
-    <dgm:cxn modelId="{E8E62AF2-B90F-4439-9F99-35E8E7A7FA62}" type="presParOf" srcId="{0F8C4796-60B9-44F0-95F7-C8F53E0D6F5B}" destId="{3C8485D3-5E38-4106-AB35-87DD069A821F}" srcOrd="6" destOrd="0" presId="urn:microsoft.com/office/officeart/2005/8/layout/process2"/>
-    <dgm:cxn modelId="{380BEE7A-542D-4DEC-B690-87F89392795E}" type="presParOf" srcId="{0F8C4796-60B9-44F0-95F7-C8F53E0D6F5B}" destId="{648E255A-B01E-4EFD-BD53-6C00B2E025D5}" srcOrd="7" destOrd="0" presId="urn:microsoft.com/office/officeart/2005/8/layout/process2"/>
-    <dgm:cxn modelId="{D97A3EBF-4CCC-4EB1-8FE0-DC70956F2619}" type="presParOf" srcId="{648E255A-B01E-4EFD-BD53-6C00B2E025D5}" destId="{A925C887-9070-437F-84BF-13625E2D8C00}" srcOrd="0" destOrd="0" presId="urn:microsoft.com/office/officeart/2005/8/layout/process2"/>
-    <dgm:cxn modelId="{35376DAD-FC46-484D-94CE-3EC64D85CACF}" type="presParOf" srcId="{0F8C4796-60B9-44F0-95F7-C8F53E0D6F5B}" destId="{164DDEB3-DF6D-4D8A-AB77-57CE925C2E9F}" srcOrd="8" destOrd="0" presId="urn:microsoft.com/office/officeart/2005/8/layout/process2"/>
-    <dgm:cxn modelId="{B8FDD49C-5E2A-4F63-BD96-A33F796A894A}" type="presParOf" srcId="{0F8C4796-60B9-44F0-95F7-C8F53E0D6F5B}" destId="{9BA57664-CD12-4F05-BF31-8399FF3938EE}" srcOrd="9" destOrd="0" presId="urn:microsoft.com/office/officeart/2005/8/layout/process2"/>
+    <dgm:cxn modelId="{35376DAD-FC46-484D-94CE-3EC64D85CACF}" type="presParOf" srcId="{0F8C4796-60B9-44F0-95F7-C8F53E0D6F5B}" destId="{164DDEB3-DF6D-4D8A-AB77-57CE925C2E9F}" srcOrd="6" destOrd="0" presId="urn:microsoft.com/office/officeart/2005/8/layout/process2"/>
+    <dgm:cxn modelId="{B8FDD49C-5E2A-4F63-BD96-A33F796A894A}" type="presParOf" srcId="{0F8C4796-60B9-44F0-95F7-C8F53E0D6F5B}" destId="{9BA57664-CD12-4F05-BF31-8399FF3938EE}" srcOrd="7" destOrd="0" presId="urn:microsoft.com/office/officeart/2005/8/layout/process2"/>
     <dgm:cxn modelId="{FEA80009-8437-40D8-A756-FAEC93C34A2D}" type="presParOf" srcId="{9BA57664-CD12-4F05-BF31-8399FF3938EE}" destId="{C5DEC020-9475-4AE8-B5C4-B31F7E4BC4BF}" srcOrd="0" destOrd="0" presId="urn:microsoft.com/office/officeart/2005/8/layout/process2"/>
-    <dgm:cxn modelId="{2135BFA1-8F37-4129-84FB-B2C5E959083D}" type="presParOf" srcId="{0F8C4796-60B9-44F0-95F7-C8F53E0D6F5B}" destId="{6F905638-7C0C-4414-A139-2B2E5BFB3BD8}" srcOrd="10" destOrd="0" presId="urn:microsoft.com/office/officeart/2005/8/layout/process2"/>
+    <dgm:cxn modelId="{2135BFA1-8F37-4129-84FB-B2C5E959083D}" type="presParOf" srcId="{0F8C4796-60B9-44F0-95F7-C8F53E0D6F5B}" destId="{6F905638-7C0C-4414-A139-2B2E5BFB3BD8}" srcOrd="8" destOrd="0" presId="urn:microsoft.com/office/officeart/2005/8/layout/process2"/>
   </dgm:cxnLst>
   <dgm:bg/>
   <dgm:whole/>
@@ -5624,8 +5533,8 @@
       </dsp:nvSpPr>
       <dsp:spPr>
         <a:xfrm>
-          <a:off x="2565565" y="5643"/>
-          <a:ext cx="2996869" cy="749217"/>
+          <a:off x="2586222" y="778"/>
+          <a:ext cx="2955555" cy="911153"/>
         </a:xfrm>
         <a:prstGeom prst="roundRect">
           <a:avLst>
@@ -5702,8 +5611,8 @@
         </a:p>
       </dsp:txBody>
       <dsp:txXfrm>
-        <a:off x="2587509" y="27587"/>
-        <a:ext cx="2952981" cy="705329"/>
+        <a:off x="2612909" y="27465"/>
+        <a:ext cx="2902181" cy="857779"/>
       </dsp:txXfrm>
     </dsp:sp>
     <dsp:sp modelId="{DE734AF0-F15D-43AA-9AA5-E7449D3D3242}">
@@ -5713,8 +5622,8 @@
       </dsp:nvSpPr>
       <dsp:spPr>
         <a:xfrm rot="5400000">
-          <a:off x="3923521" y="773591"/>
-          <a:ext cx="280956" cy="337147"/>
+          <a:off x="3893158" y="934711"/>
+          <a:ext cx="341682" cy="410019"/>
         </a:xfrm>
         <a:prstGeom prst="rightArrow">
           <a:avLst>
@@ -5772,8 +5681,8 @@
         </a:p>
       </dsp:txBody>
       <dsp:txXfrm rot="-5400000">
-        <a:off x="3962855" y="801687"/>
-        <a:ext cx="202289" cy="196669"/>
+        <a:off x="3940994" y="968880"/>
+        <a:ext cx="246011" cy="239177"/>
       </dsp:txXfrm>
     </dsp:sp>
     <dsp:sp modelId="{8DB52F31-1B42-4B55-A5C5-93099FA660CA}">
@@ -5783,8 +5692,8 @@
       </dsp:nvSpPr>
       <dsp:spPr>
         <a:xfrm>
-          <a:off x="2565565" y="1129469"/>
-          <a:ext cx="2996869" cy="749217"/>
+          <a:off x="2586222" y="1367509"/>
+          <a:ext cx="2955555" cy="911153"/>
         </a:xfrm>
         <a:prstGeom prst="roundRect">
           <a:avLst>
@@ -5913,8 +5822,8 @@
         </a:p>
       </dsp:txBody>
       <dsp:txXfrm>
-        <a:off x="2587509" y="1151413"/>
-        <a:ext cx="2952981" cy="705329"/>
+        <a:off x="2612909" y="1394196"/>
+        <a:ext cx="2902181" cy="857779"/>
       </dsp:txXfrm>
     </dsp:sp>
     <dsp:sp modelId="{D4AF0274-1388-4F6B-8D53-52A6FED89246}">
@@ -5924,8 +5833,8 @@
       </dsp:nvSpPr>
       <dsp:spPr>
         <a:xfrm rot="5400000">
-          <a:off x="3923521" y="1897417"/>
-          <a:ext cx="280956" cy="337147"/>
+          <a:off x="3893158" y="2301442"/>
+          <a:ext cx="341682" cy="410019"/>
         </a:xfrm>
         <a:prstGeom prst="rightArrow">
           <a:avLst>
@@ -5983,8 +5892,8 @@
         </a:p>
       </dsp:txBody>
       <dsp:txXfrm rot="-5400000">
-        <a:off x="3962855" y="1925513"/>
-        <a:ext cx="202289" cy="196669"/>
+        <a:off x="3940994" y="2335611"/>
+        <a:ext cx="246011" cy="239177"/>
       </dsp:txXfrm>
     </dsp:sp>
     <dsp:sp modelId="{393E3C96-C34C-451A-92F8-886DD2CD2B93}">
@@ -5994,8 +5903,8 @@
       </dsp:nvSpPr>
       <dsp:spPr>
         <a:xfrm>
-          <a:off x="2565565" y="2253295"/>
-          <a:ext cx="2996869" cy="749217"/>
+          <a:off x="2586222" y="2734240"/>
+          <a:ext cx="2955555" cy="911153"/>
         </a:xfrm>
         <a:prstGeom prst="roundRect">
           <a:avLst>
@@ -6087,8 +5996,8 @@
         </a:p>
       </dsp:txBody>
       <dsp:txXfrm>
-        <a:off x="2587509" y="2275239"/>
-        <a:ext cx="2952981" cy="705329"/>
+        <a:off x="2612909" y="2760927"/>
+        <a:ext cx="2902181" cy="857779"/>
       </dsp:txXfrm>
     </dsp:sp>
     <dsp:sp modelId="{018C7C0E-1BF5-4952-ACA5-977E53384722}">
@@ -6098,8 +6007,8 @@
       </dsp:nvSpPr>
       <dsp:spPr>
         <a:xfrm rot="5400000">
-          <a:off x="3923521" y="3021243"/>
-          <a:ext cx="280956" cy="337147"/>
+          <a:off x="3893158" y="3668172"/>
+          <a:ext cx="341682" cy="410019"/>
         </a:xfrm>
         <a:prstGeom prst="rightArrow">
           <a:avLst>
@@ -6157,19 +6066,19 @@
         </a:p>
       </dsp:txBody>
       <dsp:txXfrm rot="-5400000">
-        <a:off x="3962855" y="3049339"/>
-        <a:ext cx="202289" cy="196669"/>
+        <a:off x="3940994" y="3702341"/>
+        <a:ext cx="246011" cy="239177"/>
       </dsp:txXfrm>
     </dsp:sp>
-    <dsp:sp modelId="{3C8485D3-5E38-4106-AB35-87DD069A821F}">
+    <dsp:sp modelId="{164DDEB3-DF6D-4D8A-AB77-57CE925C2E9F}">
       <dsp:nvSpPr>
         <dsp:cNvPr id="0" name=""/>
         <dsp:cNvSpPr/>
       </dsp:nvSpPr>
       <dsp:spPr>
         <a:xfrm>
-          <a:off x="2565565" y="3377121"/>
-          <a:ext cx="2996869" cy="749217"/>
+          <a:off x="2586222" y="4100970"/>
+          <a:ext cx="2955555" cy="911153"/>
         </a:xfrm>
         <a:prstGeom prst="roundRect">
           <a:avLst>
@@ -6236,11 +6145,43 @@
           </a:r>
           <a:r>
             <a:rPr lang="de-DE" sz="1600" kern="1200" dirty="0" err="1"/>
-            <a:t>defined</a:t>
+            <a:t>passed</a:t>
           </a:r>
           <a:r>
             <a:rPr lang="de-DE" sz="1600" kern="1200" dirty="0"/>
-            <a:t> in </a:t>
+            <a:t> </a:t>
+          </a:r>
+          <a:r>
+            <a:rPr lang="de-DE" sz="1600" kern="1200" dirty="0" err="1"/>
+            <a:t>to</a:t>
+          </a:r>
+          <a:r>
+            <a:rPr lang="de-DE" sz="1600" kern="1200" dirty="0"/>
+            <a:t> „</a:t>
+          </a:r>
+          <a:r>
+            <a:rPr lang="de-DE" sz="1600" kern="1200" dirty="0" err="1"/>
+            <a:t>runScenarios</a:t>
+          </a:r>
+          <a:r>
+            <a:rPr lang="de-DE" sz="1600" kern="1200" dirty="0"/>
+            <a:t>()“ </a:t>
+          </a:r>
+          <a:r>
+            <a:rPr lang="de-DE" sz="1600" kern="1200" dirty="0" err="1"/>
+            <a:t>function</a:t>
+          </a:r>
+          <a:r>
+            <a:rPr lang="de-DE" sz="1600" kern="1200" dirty="0"/>
+            <a:t> </a:t>
+          </a:r>
+          <a:r>
+            <a:rPr lang="de-DE" sz="1600" kern="1200" dirty="0" err="1"/>
+            <a:t>with</a:t>
+          </a:r>
+          <a:r>
+            <a:rPr lang="de-DE" sz="1600" kern="1200" dirty="0"/>
+            <a:t> </a:t>
           </a:r>
           <a:r>
             <a:rPr lang="de-DE" sz="1600" kern="1200" dirty="0" err="1"/>
@@ -6248,40 +6189,37 @@
           </a:r>
           <a:r>
             <a:rPr lang="de-DE" sz="1600" kern="1200" dirty="0"/>
-            <a:t> „Code/</a:t>
+            <a:t> „</a:t>
           </a:r>
           <a:r>
             <a:rPr lang="de-DE" sz="1600" kern="1200" dirty="0" err="1"/>
-            <a:t>InputCode</a:t>
+            <a:t>customParams</a:t>
           </a:r>
           <a:r>
             <a:rPr lang="de-DE" sz="1600" kern="1200" dirty="0"/>
-            <a:t>/</a:t>
+            <a:t>“ </a:t>
           </a:r>
           <a:r>
             <a:rPr lang="de-DE" sz="1600" kern="1200" dirty="0" err="1"/>
-            <a:t>TestParameters.R</a:t>
-          </a:r>
-          <a:r>
-            <a:rPr lang="de-DE" sz="1600" kern="1200" dirty="0"/>
-            <a:t>“</a:t>
-          </a:r>
+            <a:t>argument</a:t>
+          </a:r>
+          <a:endParaRPr lang="de-DE" sz="1600" kern="1200" dirty="0"/>
         </a:p>
       </dsp:txBody>
       <dsp:txXfrm>
-        <a:off x="2587509" y="3399065"/>
-        <a:ext cx="2952981" cy="705329"/>
+        <a:off x="2612909" y="4127657"/>
+        <a:ext cx="2902181" cy="857779"/>
       </dsp:txXfrm>
     </dsp:sp>
-    <dsp:sp modelId="{648E255A-B01E-4EFD-BD53-6C00B2E025D5}">
+    <dsp:sp modelId="{9BA57664-CD12-4F05-BF31-8399FF3938EE}">
       <dsp:nvSpPr>
         <dsp:cNvPr id="0" name=""/>
         <dsp:cNvSpPr/>
       </dsp:nvSpPr>
       <dsp:spPr>
         <a:xfrm rot="5400000">
-          <a:off x="3923521" y="4145069"/>
-          <a:ext cx="280956" cy="337147"/>
+          <a:off x="3893158" y="5034903"/>
+          <a:ext cx="341682" cy="410019"/>
         </a:xfrm>
         <a:prstGeom prst="rightArrow">
           <a:avLst>
@@ -6323,7 +6261,7 @@
         </a:bodyPr>
         <a:lstStyle/>
         <a:p>
-          <a:pPr marL="0" lvl="0" indent="0" algn="ctr" defTabSz="1066800">
+          <a:pPr marL="0" lvl="0" indent="0" algn="ctr" defTabSz="755650">
             <a:lnSpc>
               <a:spcPct val="90000"/>
             </a:lnSpc>
@@ -6335,23 +6273,23 @@
             </a:spcAft>
             <a:buNone/>
           </a:pPr>
-          <a:endParaRPr lang="en-US" sz="2400" kern="1200"/>
+          <a:endParaRPr lang="en-US" sz="1700" kern="1200"/>
         </a:p>
       </dsp:txBody>
       <dsp:txXfrm rot="-5400000">
-        <a:off x="3962855" y="4173165"/>
-        <a:ext cx="202289" cy="196669"/>
+        <a:off x="3940994" y="5069072"/>
+        <a:ext cx="246011" cy="239177"/>
       </dsp:txXfrm>
     </dsp:sp>
-    <dsp:sp modelId="{164DDEB3-DF6D-4D8A-AB77-57CE925C2E9F}">
+    <dsp:sp modelId="{6F905638-7C0C-4414-A139-2B2E5BFB3BD8}">
       <dsp:nvSpPr>
         <dsp:cNvPr id="0" name=""/>
         <dsp:cNvSpPr/>
       </dsp:nvSpPr>
       <dsp:spPr>
         <a:xfrm>
-          <a:off x="2565565" y="4500947"/>
-          <a:ext cx="2996869" cy="749217"/>
+          <a:off x="2586222" y="5467701"/>
+          <a:ext cx="2955555" cy="911153"/>
         </a:xfrm>
         <a:prstGeom prst="roundRect">
           <a:avLst>
@@ -6395,12 +6333,12 @@
         </a:fontRef>
       </dsp:style>
       <dsp:txBody>
-        <a:bodyPr spcFirstLastPara="0" vert="horz" wrap="square" lIns="60960" tIns="60960" rIns="60960" bIns="60960" numCol="1" spcCol="1270" anchor="ctr" anchorCtr="0">
+        <a:bodyPr spcFirstLastPara="0" vert="horz" wrap="square" lIns="80010" tIns="80010" rIns="80010" bIns="80010" numCol="1" spcCol="1270" anchor="ctr" anchorCtr="0">
           <a:noAutofit/>
         </a:bodyPr>
         <a:lstStyle/>
         <a:p>
-          <a:pPr marL="0" lvl="0" indent="0" algn="ctr" defTabSz="711200">
+          <a:pPr marL="0" lvl="0" indent="0" algn="ctr" defTabSz="933450">
             <a:lnSpc>
               <a:spcPct val="90000"/>
             </a:lnSpc>
@@ -6413,254 +6351,43 @@
             <a:buNone/>
           </a:pPr>
           <a:r>
-            <a:rPr lang="de-DE" sz="1600" kern="1200" dirty="0"/>
+            <a:rPr lang="de-DE" sz="2100" kern="1200" dirty="0"/>
             <a:t>Parameters </a:t>
           </a:r>
           <a:r>
-            <a:rPr lang="de-DE" sz="1600" kern="1200" dirty="0" err="1"/>
-            <a:t>passed</a:t>
-          </a:r>
-          <a:r>
-            <a:rPr lang="de-DE" sz="1600" kern="1200" dirty="0"/>
+            <a:rPr lang="de-DE" sz="2100" kern="1200" dirty="0" err="1"/>
+            <a:t>defined</a:t>
+          </a:r>
+          <a:r>
+            <a:rPr lang="de-DE" sz="2100" kern="1200" dirty="0"/>
+            <a:t> in </a:t>
+          </a:r>
+          <a:r>
+            <a:rPr lang="de-DE" sz="2100" kern="1200" dirty="0" err="1"/>
+            <a:t>the</a:t>
+          </a:r>
+          <a:r>
+            <a:rPr lang="de-DE" sz="2100" kern="1200" dirty="0"/>
             <a:t> </a:t>
           </a:r>
           <a:r>
-            <a:rPr lang="de-DE" sz="1600" kern="1200" dirty="0" err="1"/>
-            <a:t>to</a:t>
-          </a:r>
-          <a:r>
-            <a:rPr lang="de-DE" sz="1600" kern="1200" dirty="0"/>
-            <a:t> „</a:t>
-          </a:r>
-          <a:r>
-            <a:rPr lang="de-DE" sz="1600" kern="1200" dirty="0" err="1"/>
-            <a:t>runScenarios</a:t>
-          </a:r>
-          <a:r>
-            <a:rPr lang="de-DE" sz="1600" kern="1200" dirty="0"/>
-            <a:t>()“ </a:t>
-          </a:r>
-          <a:r>
-            <a:rPr lang="de-DE" sz="1600" kern="1200" dirty="0" err="1"/>
-            <a:t>function</a:t>
-          </a:r>
-          <a:r>
-            <a:rPr lang="de-DE" sz="1600" kern="1200" dirty="0"/>
+            <a:rPr lang="de-DE" sz="2100" kern="1200" dirty="0" err="1"/>
+            <a:t>Application</a:t>
+          </a:r>
+          <a:r>
+            <a:rPr lang="de-DE" sz="2100" kern="1200" dirty="0"/>
             <a:t> </a:t>
           </a:r>
           <a:r>
-            <a:rPr lang="de-DE" sz="1600" kern="1200" dirty="0" err="1"/>
-            <a:t>with</a:t>
-          </a:r>
-          <a:r>
-            <a:rPr lang="de-DE" sz="1600" kern="1200" dirty="0"/>
-            <a:t> </a:t>
-          </a:r>
-          <a:r>
-            <a:rPr lang="de-DE" sz="1600" kern="1200" dirty="0" err="1"/>
-            <a:t>the</a:t>
-          </a:r>
-          <a:r>
-            <a:rPr lang="de-DE" sz="1600" kern="1200" dirty="0"/>
-            <a:t> „</a:t>
-          </a:r>
-          <a:r>
-            <a:rPr lang="de-DE" sz="1600" kern="1200" dirty="0" err="1"/>
-            <a:t>customParams</a:t>
-          </a:r>
-          <a:r>
-            <a:rPr lang="de-DE" sz="1600" kern="1200" dirty="0"/>
-            <a:t>“ </a:t>
-          </a:r>
-          <a:r>
-            <a:rPr lang="de-DE" sz="1600" kern="1200" dirty="0" err="1"/>
-            <a:t>argument</a:t>
-          </a:r>
-          <a:endParaRPr lang="de-DE" sz="1600" kern="1200" dirty="0"/>
+            <a:rPr lang="de-DE" sz="2100" kern="1200" dirty="0" err="1"/>
+            <a:t>protocol</a:t>
+          </a:r>
+          <a:endParaRPr lang="de-DE" sz="2100" kern="1200" dirty="0"/>
         </a:p>
       </dsp:txBody>
       <dsp:txXfrm>
-        <a:off x="2587509" y="4522891"/>
-        <a:ext cx="2952981" cy="705329"/>
-      </dsp:txXfrm>
-    </dsp:sp>
-    <dsp:sp modelId="{9BA57664-CD12-4F05-BF31-8399FF3938EE}">
-      <dsp:nvSpPr>
-        <dsp:cNvPr id="0" name=""/>
-        <dsp:cNvSpPr/>
-      </dsp:nvSpPr>
-      <dsp:spPr>
-        <a:xfrm rot="5400000">
-          <a:off x="3923521" y="5268894"/>
-          <a:ext cx="280956" cy="337147"/>
-        </a:xfrm>
-        <a:prstGeom prst="rightArrow">
-          <a:avLst>
-            <a:gd name="adj1" fmla="val 60000"/>
-            <a:gd name="adj2" fmla="val 50000"/>
-          </a:avLst>
-        </a:prstGeom>
-        <a:solidFill>
-          <a:schemeClr val="accent1">
-            <a:tint val="60000"/>
-            <a:hueOff val="0"/>
-            <a:satOff val="0"/>
-            <a:lumOff val="0"/>
-            <a:alphaOff val="0"/>
-          </a:schemeClr>
-        </a:solidFill>
-        <a:ln>
-          <a:noFill/>
-        </a:ln>
-        <a:effectLst/>
-      </dsp:spPr>
-      <dsp:style>
-        <a:lnRef idx="0">
-          <a:scrgbClr r="0" g="0" b="0"/>
-        </a:lnRef>
-        <a:fillRef idx="1">
-          <a:scrgbClr r="0" g="0" b="0"/>
-        </a:fillRef>
-        <a:effectRef idx="0">
-          <a:scrgbClr r="0" g="0" b="0"/>
-        </a:effectRef>
-        <a:fontRef idx="minor">
-          <a:schemeClr val="lt1"/>
-        </a:fontRef>
-      </dsp:style>
-      <dsp:txBody>
-        <a:bodyPr spcFirstLastPara="0" vert="horz" wrap="square" lIns="0" tIns="0" rIns="0" bIns="0" numCol="1" spcCol="1270" anchor="ctr" anchorCtr="0">
-          <a:noAutofit/>
-        </a:bodyPr>
-        <a:lstStyle/>
-        <a:p>
-          <a:pPr marL="0" lvl="0" indent="0" algn="ctr" defTabSz="622300">
-            <a:lnSpc>
-              <a:spcPct val="90000"/>
-            </a:lnSpc>
-            <a:spcBef>
-              <a:spcPct val="0"/>
-            </a:spcBef>
-            <a:spcAft>
-              <a:spcPct val="35000"/>
-            </a:spcAft>
-            <a:buNone/>
-          </a:pPr>
-          <a:endParaRPr lang="en-US" sz="1400" kern="1200"/>
-        </a:p>
-      </dsp:txBody>
-      <dsp:txXfrm rot="-5400000">
-        <a:off x="3962855" y="5296990"/>
-        <a:ext cx="202289" cy="196669"/>
-      </dsp:txXfrm>
-    </dsp:sp>
-    <dsp:sp modelId="{6F905638-7C0C-4414-A139-2B2E5BFB3BD8}">
-      <dsp:nvSpPr>
-        <dsp:cNvPr id="0" name=""/>
-        <dsp:cNvSpPr/>
-      </dsp:nvSpPr>
-      <dsp:spPr>
-        <a:xfrm>
-          <a:off x="2565565" y="5624773"/>
-          <a:ext cx="2996869" cy="749217"/>
-        </a:xfrm>
-        <a:prstGeom prst="roundRect">
-          <a:avLst>
-            <a:gd name="adj" fmla="val 10000"/>
-          </a:avLst>
-        </a:prstGeom>
-        <a:solidFill>
-          <a:schemeClr val="accent1">
-            <a:hueOff val="0"/>
-            <a:satOff val="0"/>
-            <a:lumOff val="0"/>
-            <a:alphaOff val="0"/>
-          </a:schemeClr>
-        </a:solidFill>
-        <a:ln w="12700" cap="flat" cmpd="sng" algn="ctr">
-          <a:solidFill>
-            <a:schemeClr val="lt1">
-              <a:hueOff val="0"/>
-              <a:satOff val="0"/>
-              <a:lumOff val="0"/>
-              <a:alphaOff val="0"/>
-            </a:schemeClr>
-          </a:solidFill>
-          <a:prstDash val="solid"/>
-          <a:miter lim="800000"/>
-        </a:ln>
-        <a:effectLst/>
-      </dsp:spPr>
-      <dsp:style>
-        <a:lnRef idx="2">
-          <a:scrgbClr r="0" g="0" b="0"/>
-        </a:lnRef>
-        <a:fillRef idx="1">
-          <a:scrgbClr r="0" g="0" b="0"/>
-        </a:fillRef>
-        <a:effectRef idx="0">
-          <a:scrgbClr r="0" g="0" b="0"/>
-        </a:effectRef>
-        <a:fontRef idx="minor">
-          <a:schemeClr val="lt1"/>
-        </a:fontRef>
-      </dsp:style>
-      <dsp:txBody>
-        <a:bodyPr spcFirstLastPara="0" vert="horz" wrap="square" lIns="72390" tIns="72390" rIns="72390" bIns="72390" numCol="1" spcCol="1270" anchor="ctr" anchorCtr="0">
-          <a:noAutofit/>
-        </a:bodyPr>
-        <a:lstStyle/>
-        <a:p>
-          <a:pPr marL="0" lvl="0" indent="0" algn="ctr" defTabSz="844550">
-            <a:lnSpc>
-              <a:spcPct val="90000"/>
-            </a:lnSpc>
-            <a:spcBef>
-              <a:spcPct val="0"/>
-            </a:spcBef>
-            <a:spcAft>
-              <a:spcPct val="35000"/>
-            </a:spcAft>
-            <a:buNone/>
-          </a:pPr>
-          <a:r>
-            <a:rPr lang="de-DE" sz="1900" kern="1200" dirty="0"/>
-            <a:t>Parameters </a:t>
-          </a:r>
-          <a:r>
-            <a:rPr lang="de-DE" sz="1900" kern="1200" dirty="0" err="1"/>
-            <a:t>defined</a:t>
-          </a:r>
-          <a:r>
-            <a:rPr lang="de-DE" sz="1900" kern="1200" dirty="0"/>
-            <a:t> in </a:t>
-          </a:r>
-          <a:r>
-            <a:rPr lang="de-DE" sz="1900" kern="1200" dirty="0" err="1"/>
-            <a:t>the</a:t>
-          </a:r>
-          <a:r>
-            <a:rPr lang="de-DE" sz="1900" kern="1200" dirty="0"/>
-            <a:t> </a:t>
-          </a:r>
-          <a:r>
-            <a:rPr lang="de-DE" sz="1900" kern="1200" dirty="0" err="1"/>
-            <a:t>Application</a:t>
-          </a:r>
-          <a:r>
-            <a:rPr lang="de-DE" sz="1900" kern="1200" dirty="0"/>
-            <a:t> </a:t>
-          </a:r>
-          <a:r>
-            <a:rPr lang="de-DE" sz="1900" kern="1200" dirty="0" err="1"/>
-            <a:t>protocol</a:t>
-          </a:r>
-          <a:endParaRPr lang="de-DE" sz="1900" kern="1200" dirty="0"/>
-        </a:p>
-      </dsp:txBody>
-      <dsp:txXfrm>
-        <a:off x="2587509" y="5646717"/>
-        <a:ext cx="2952981" cy="705329"/>
+        <a:off x="2612909" y="5494388"/>
+        <a:ext cx="2902181" cy="857779"/>
       </dsp:txXfrm>
     </dsp:sp>
   </dsp:spTree>
@@ -9264,7 +8991,7 @@
           <a:p>
             <a:fld id="{B199164D-C87C-46DA-8BA8-D57C4A9AE1EA}" type="datetimeFigureOut">
               <a:rPr lang="en-US" smtClean="0"/>
-              <a:t>4/25/2023</a:t>
+              <a:t>4/26/2023</a:t>
             </a:fld>
             <a:endParaRPr lang="en-US"/>
           </a:p>
@@ -9462,7 +9189,7 @@
           <a:p>
             <a:fld id="{B199164D-C87C-46DA-8BA8-D57C4A9AE1EA}" type="datetimeFigureOut">
               <a:rPr lang="en-US" smtClean="0"/>
-              <a:t>4/25/2023</a:t>
+              <a:t>4/26/2023</a:t>
             </a:fld>
             <a:endParaRPr lang="en-US"/>
           </a:p>
@@ -9670,7 +9397,7 @@
           <a:p>
             <a:fld id="{B199164D-C87C-46DA-8BA8-D57C4A9AE1EA}" type="datetimeFigureOut">
               <a:rPr lang="en-US" smtClean="0"/>
-              <a:t>4/25/2023</a:t>
+              <a:t>4/26/2023</a:t>
             </a:fld>
             <a:endParaRPr lang="en-US"/>
           </a:p>
@@ -9868,7 +9595,7 @@
           <a:p>
             <a:fld id="{B199164D-C87C-46DA-8BA8-D57C4A9AE1EA}" type="datetimeFigureOut">
               <a:rPr lang="en-US" smtClean="0"/>
-              <a:t>4/25/2023</a:t>
+              <a:t>4/26/2023</a:t>
             </a:fld>
             <a:endParaRPr lang="en-US"/>
           </a:p>
@@ -10143,7 +9870,7 @@
           <a:p>
             <a:fld id="{B199164D-C87C-46DA-8BA8-D57C4A9AE1EA}" type="datetimeFigureOut">
               <a:rPr lang="en-US" smtClean="0"/>
-              <a:t>4/25/2023</a:t>
+              <a:t>4/26/2023</a:t>
             </a:fld>
             <a:endParaRPr lang="en-US"/>
           </a:p>
@@ -10408,7 +10135,7 @@
           <a:p>
             <a:fld id="{B199164D-C87C-46DA-8BA8-D57C4A9AE1EA}" type="datetimeFigureOut">
               <a:rPr lang="en-US" smtClean="0"/>
-              <a:t>4/25/2023</a:t>
+              <a:t>4/26/2023</a:t>
             </a:fld>
             <a:endParaRPr lang="en-US"/>
           </a:p>
@@ -10820,7 +10547,7 @@
           <a:p>
             <a:fld id="{B199164D-C87C-46DA-8BA8-D57C4A9AE1EA}" type="datetimeFigureOut">
               <a:rPr lang="en-US" smtClean="0"/>
-              <a:t>4/25/2023</a:t>
+              <a:t>4/26/2023</a:t>
             </a:fld>
             <a:endParaRPr lang="en-US"/>
           </a:p>
@@ -10961,7 +10688,7 @@
           <a:p>
             <a:fld id="{B199164D-C87C-46DA-8BA8-D57C4A9AE1EA}" type="datetimeFigureOut">
               <a:rPr lang="en-US" smtClean="0"/>
-              <a:t>4/25/2023</a:t>
+              <a:t>4/26/2023</a:t>
             </a:fld>
             <a:endParaRPr lang="en-US"/>
           </a:p>
@@ -11074,7 +10801,7 @@
           <a:p>
             <a:fld id="{B199164D-C87C-46DA-8BA8-D57C4A9AE1EA}" type="datetimeFigureOut">
               <a:rPr lang="en-US" smtClean="0"/>
-              <a:t>4/25/2023</a:t>
+              <a:t>4/26/2023</a:t>
             </a:fld>
             <a:endParaRPr lang="en-US"/>
           </a:p>
@@ -11385,7 +11112,7 @@
           <a:p>
             <a:fld id="{B199164D-C87C-46DA-8BA8-D57C4A9AE1EA}" type="datetimeFigureOut">
               <a:rPr lang="en-US" smtClean="0"/>
-              <a:t>4/25/2023</a:t>
+              <a:t>4/26/2023</a:t>
             </a:fld>
             <a:endParaRPr lang="en-US"/>
           </a:p>
@@ -11673,7 +11400,7 @@
           <a:p>
             <a:fld id="{B199164D-C87C-46DA-8BA8-D57C4A9AE1EA}" type="datetimeFigureOut">
               <a:rPr lang="en-US" smtClean="0"/>
-              <a:t>4/25/2023</a:t>
+              <a:t>4/26/2023</a:t>
             </a:fld>
             <a:endParaRPr lang="en-US"/>
           </a:p>
@@ -11914,7 +11641,7 @@
           <a:p>
             <a:fld id="{B199164D-C87C-46DA-8BA8-D57C4A9AE1EA}" type="datetimeFigureOut">
               <a:rPr lang="en-US" smtClean="0"/>
-              <a:t>4/25/2023</a:t>
+              <a:t>4/26/2023</a:t>
             </a:fld>
             <a:endParaRPr lang="en-US"/>
           </a:p>
@@ -12876,7 +12603,7 @@
           <p:nvPr>
             <p:extLst>
               <p:ext uri="{D42A27DB-BD31-4B8C-83A1-F6EECF244321}">
-                <p14:modId xmlns:p14="http://schemas.microsoft.com/office/powerpoint/2010/main" val="1460372829"/>
+                <p14:modId xmlns:p14="http://schemas.microsoft.com/office/powerpoint/2010/main" val="4042890966"/>
               </p:ext>
             </p:extLst>
           </p:nvPr>

</xml_diff>